<commit_message>
moss data is not useful. starting using leas ecg data
</commit_message>
<xml_diff>
--- a/output/fit_periodical/summary.pptx
+++ b/output/fit_periodical/summary.pptx
@@ -2,12 +2,12 @@
 <file path=ppt/presentation.xml><?xml version="1.0" encoding="utf-8"?>
 <p:presentation xmlns:a="http://schemas.openxmlformats.org/drawingml/2006/main" xmlns:r="http://schemas.openxmlformats.org/officeDocument/2006/relationships" xmlns:p="http://schemas.openxmlformats.org/presentationml/2006/main" saveSubsetFonts="1">
   <p:sldMasterIdLst>
-    <p:sldMasterId id="2147483660" r:id="rId1"/>
+    <p:sldMasterId id="2147483696" r:id="rId1"/>
   </p:sldMasterIdLst>
   <p:sldIdLst>
-    <p:sldId id="256" r:id="rId2"/>
+    <p:sldId id="257" r:id="rId2"/>
   </p:sldIdLst>
-  <p:sldSz cx="6858000" cy="9906000" type="A4"/>
+  <p:sldSz cx="25217438" cy="7386638"/>
   <p:notesSz cx="6858000" cy="9144000"/>
   <p:defaultTextStyle>
     <a:defPPr>
@@ -104,6 +104,11 @@
       </a:defRPr>
     </a:lvl9pPr>
   </p:defaultTextStyle>
+  <p:extLst>
+    <p:ext uri="{EFAFB233-063F-42B5-8137-9DF3F51BA10A}">
+      <p15:sldGuideLst xmlns:p15="http://schemas.microsoft.com/office/powerpoint/2012/main"/>
+    </p:ext>
+  </p:extLst>
 </p:presentation>
 </file>
 
@@ -136,15 +141,15 @@
         </p:nvSpPr>
         <p:spPr>
           <a:xfrm>
-            <a:off x="514350" y="1621191"/>
-            <a:ext cx="5829300" cy="3448756"/>
+            <a:off x="3152180" y="1208879"/>
+            <a:ext cx="18913079" cy="2571644"/>
           </a:xfrm>
         </p:spPr>
         <p:txBody>
           <a:bodyPr anchor="b"/>
           <a:lstStyle>
             <a:lvl1pPr algn="ctr">
-              <a:defRPr sz="4500"/>
+              <a:defRPr sz="6463"/>
             </a:lvl1pPr>
           </a:lstStyle>
           <a:p>
@@ -168,8 +173,8 @@
         </p:nvSpPr>
         <p:spPr>
           <a:xfrm>
-            <a:off x="857250" y="5202944"/>
-            <a:ext cx="5143500" cy="2391656"/>
+            <a:off x="3152180" y="3879695"/>
+            <a:ext cx="18913079" cy="1783394"/>
           </a:xfrm>
         </p:spPr>
         <p:txBody>
@@ -177,39 +182,39 @@
           <a:lstStyle>
             <a:lvl1pPr marL="0" indent="0" algn="ctr">
               <a:buNone/>
-              <a:defRPr sz="1800"/>
+              <a:defRPr sz="2585"/>
             </a:lvl1pPr>
-            <a:lvl2pPr marL="342900" indent="0" algn="ctr">
-              <a:buNone/>
-              <a:defRPr sz="1500"/>
+            <a:lvl2pPr marL="492450" indent="0" algn="ctr">
+              <a:buNone/>
+              <a:defRPr sz="2154"/>
             </a:lvl2pPr>
-            <a:lvl3pPr marL="685800" indent="0" algn="ctr">
-              <a:buNone/>
-              <a:defRPr sz="1350"/>
+            <a:lvl3pPr marL="984900" indent="0" algn="ctr">
+              <a:buNone/>
+              <a:defRPr sz="1939"/>
             </a:lvl3pPr>
-            <a:lvl4pPr marL="1028700" indent="0" algn="ctr">
-              <a:buNone/>
-              <a:defRPr sz="1200"/>
+            <a:lvl4pPr marL="1477350" indent="0" algn="ctr">
+              <a:buNone/>
+              <a:defRPr sz="1723"/>
             </a:lvl4pPr>
-            <a:lvl5pPr marL="1371600" indent="0" algn="ctr">
-              <a:buNone/>
-              <a:defRPr sz="1200"/>
+            <a:lvl5pPr marL="1969800" indent="0" algn="ctr">
+              <a:buNone/>
+              <a:defRPr sz="1723"/>
             </a:lvl5pPr>
-            <a:lvl6pPr marL="1714500" indent="0" algn="ctr">
-              <a:buNone/>
-              <a:defRPr sz="1200"/>
+            <a:lvl6pPr marL="2462251" indent="0" algn="ctr">
+              <a:buNone/>
+              <a:defRPr sz="1723"/>
             </a:lvl6pPr>
-            <a:lvl7pPr marL="2057400" indent="0" algn="ctr">
-              <a:buNone/>
-              <a:defRPr sz="1200"/>
+            <a:lvl7pPr marL="2954701" indent="0" algn="ctr">
+              <a:buNone/>
+              <a:defRPr sz="1723"/>
             </a:lvl7pPr>
-            <a:lvl8pPr marL="2400300" indent="0" algn="ctr">
-              <a:buNone/>
-              <a:defRPr sz="1200"/>
+            <a:lvl8pPr marL="3447151" indent="0" algn="ctr">
+              <a:buNone/>
+              <a:defRPr sz="1723"/>
             </a:lvl8pPr>
-            <a:lvl9pPr marL="2743200" indent="0" algn="ctr">
-              <a:buNone/>
-              <a:defRPr sz="1200"/>
+            <a:lvl9pPr marL="3939601" indent="0" algn="ctr">
+              <a:buNone/>
+              <a:defRPr sz="1723"/>
             </a:lvl9pPr>
           </a:lstStyle>
           <a:p>
@@ -238,7 +243,7 @@
           <a:p>
             <a:fld id="{8B4270F6-19A4-4DCF-B5FF-17A8E016E4E6}" type="datetimeFigureOut">
               <a:rPr lang="de-DE" smtClean="0"/>
-              <a:t>01.09.2021</a:t>
+              <a:t>06.09.2021</a:t>
             </a:fld>
             <a:endParaRPr lang="de-DE"/>
           </a:p>
@@ -289,7 +294,7 @@
     </p:spTree>
     <p:extLst>
       <p:ext uri="{BB962C8B-B14F-4D97-AF65-F5344CB8AC3E}">
-        <p14:creationId xmlns:p14="http://schemas.microsoft.com/office/powerpoint/2010/main" val="746050608"/>
+        <p14:creationId xmlns:p14="http://schemas.microsoft.com/office/powerpoint/2010/main" val="1895698506"/>
       </p:ext>
     </p:extLst>
   </p:cSld>
@@ -408,7 +413,7 @@
           <a:p>
             <a:fld id="{8B4270F6-19A4-4DCF-B5FF-17A8E016E4E6}" type="datetimeFigureOut">
               <a:rPr lang="de-DE" smtClean="0"/>
-              <a:t>01.09.2021</a:t>
+              <a:t>06.09.2021</a:t>
             </a:fld>
             <a:endParaRPr lang="de-DE"/>
           </a:p>
@@ -459,7 +464,7 @@
     </p:spTree>
     <p:extLst>
       <p:ext uri="{BB962C8B-B14F-4D97-AF65-F5344CB8AC3E}">
-        <p14:creationId xmlns:p14="http://schemas.microsoft.com/office/powerpoint/2010/main" val="1197473948"/>
+        <p14:creationId xmlns:p14="http://schemas.microsoft.com/office/powerpoint/2010/main" val="2915466198"/>
       </p:ext>
     </p:extLst>
   </p:cSld>
@@ -498,8 +503,8 @@
         </p:nvSpPr>
         <p:spPr>
           <a:xfrm>
-            <a:off x="4907757" y="527403"/>
-            <a:ext cx="1478756" cy="8394877"/>
+            <a:off x="18046229" y="393270"/>
+            <a:ext cx="5437510" cy="6259834"/>
           </a:xfrm>
         </p:spPr>
         <p:txBody>
@@ -526,8 +531,8 @@
         </p:nvSpPr>
         <p:spPr>
           <a:xfrm>
-            <a:off x="471488" y="527403"/>
-            <a:ext cx="4350544" cy="8394877"/>
+            <a:off x="1733699" y="393270"/>
+            <a:ext cx="15997312" cy="6259834"/>
           </a:xfrm>
         </p:spPr>
         <p:txBody>
@@ -588,7 +593,7 @@
           <a:p>
             <a:fld id="{8B4270F6-19A4-4DCF-B5FF-17A8E016E4E6}" type="datetimeFigureOut">
               <a:rPr lang="de-DE" smtClean="0"/>
-              <a:t>01.09.2021</a:t>
+              <a:t>06.09.2021</a:t>
             </a:fld>
             <a:endParaRPr lang="de-DE"/>
           </a:p>
@@ -639,7 +644,7 @@
     </p:spTree>
     <p:extLst>
       <p:ext uri="{BB962C8B-B14F-4D97-AF65-F5344CB8AC3E}">
-        <p14:creationId xmlns:p14="http://schemas.microsoft.com/office/powerpoint/2010/main" val="67872376"/>
+        <p14:creationId xmlns:p14="http://schemas.microsoft.com/office/powerpoint/2010/main" val="3151352066"/>
       </p:ext>
     </p:extLst>
   </p:cSld>
@@ -758,7 +763,7 @@
           <a:p>
             <a:fld id="{8B4270F6-19A4-4DCF-B5FF-17A8E016E4E6}" type="datetimeFigureOut">
               <a:rPr lang="de-DE" smtClean="0"/>
-              <a:t>01.09.2021</a:t>
+              <a:t>06.09.2021</a:t>
             </a:fld>
             <a:endParaRPr lang="de-DE"/>
           </a:p>
@@ -809,7 +814,7 @@
     </p:spTree>
     <p:extLst>
       <p:ext uri="{BB962C8B-B14F-4D97-AF65-F5344CB8AC3E}">
-        <p14:creationId xmlns:p14="http://schemas.microsoft.com/office/powerpoint/2010/main" val="2899675608"/>
+        <p14:creationId xmlns:p14="http://schemas.microsoft.com/office/powerpoint/2010/main" val="4242095065"/>
       </p:ext>
     </p:extLst>
   </p:cSld>
@@ -848,15 +853,15 @@
         </p:nvSpPr>
         <p:spPr>
           <a:xfrm>
-            <a:off x="467916" y="2469624"/>
-            <a:ext cx="5915025" cy="4120620"/>
+            <a:off x="1720565" y="1841531"/>
+            <a:ext cx="21750040" cy="3072636"/>
           </a:xfrm>
         </p:spPr>
         <p:txBody>
           <a:bodyPr anchor="b"/>
           <a:lstStyle>
             <a:lvl1pPr>
-              <a:defRPr sz="4500"/>
+              <a:defRPr sz="6463"/>
             </a:lvl1pPr>
           </a:lstStyle>
           <a:p>
@@ -880,8 +885,8 @@
         </p:nvSpPr>
         <p:spPr>
           <a:xfrm>
-            <a:off x="467916" y="6629226"/>
-            <a:ext cx="5915025" cy="2166937"/>
+            <a:off x="1720565" y="4943235"/>
+            <a:ext cx="21750040" cy="1615827"/>
           </a:xfrm>
         </p:spPr>
         <p:txBody>
@@ -889,15 +894,17 @@
           <a:lstStyle>
             <a:lvl1pPr marL="0" indent="0">
               <a:buNone/>
-              <a:defRPr sz="1800">
+              <a:defRPr sz="2585">
                 <a:solidFill>
-                  <a:schemeClr val="tx1"/>
+                  <a:schemeClr val="tx1">
+                    <a:tint val="75000"/>
+                  </a:schemeClr>
                 </a:solidFill>
               </a:defRPr>
             </a:lvl1pPr>
-            <a:lvl2pPr marL="342900" indent="0">
-              <a:buNone/>
-              <a:defRPr sz="1500">
+            <a:lvl2pPr marL="492450" indent="0">
+              <a:buNone/>
+              <a:defRPr sz="2154">
                 <a:solidFill>
                   <a:schemeClr val="tx1">
                     <a:tint val="75000"/>
@@ -905,9 +912,9 @@
                 </a:solidFill>
               </a:defRPr>
             </a:lvl2pPr>
-            <a:lvl3pPr marL="685800" indent="0">
-              <a:buNone/>
-              <a:defRPr sz="1350">
+            <a:lvl3pPr marL="984900" indent="0">
+              <a:buNone/>
+              <a:defRPr sz="1939">
                 <a:solidFill>
                   <a:schemeClr val="tx1">
                     <a:tint val="75000"/>
@@ -915,9 +922,9 @@
                 </a:solidFill>
               </a:defRPr>
             </a:lvl3pPr>
-            <a:lvl4pPr marL="1028700" indent="0">
-              <a:buNone/>
-              <a:defRPr sz="1200">
+            <a:lvl4pPr marL="1477350" indent="0">
+              <a:buNone/>
+              <a:defRPr sz="1723">
                 <a:solidFill>
                   <a:schemeClr val="tx1">
                     <a:tint val="75000"/>
@@ -925,9 +932,9 @@
                 </a:solidFill>
               </a:defRPr>
             </a:lvl4pPr>
-            <a:lvl5pPr marL="1371600" indent="0">
-              <a:buNone/>
-              <a:defRPr sz="1200">
+            <a:lvl5pPr marL="1969800" indent="0">
+              <a:buNone/>
+              <a:defRPr sz="1723">
                 <a:solidFill>
                   <a:schemeClr val="tx1">
                     <a:tint val="75000"/>
@@ -935,9 +942,9 @@
                 </a:solidFill>
               </a:defRPr>
             </a:lvl5pPr>
-            <a:lvl6pPr marL="1714500" indent="0">
-              <a:buNone/>
-              <a:defRPr sz="1200">
+            <a:lvl6pPr marL="2462251" indent="0">
+              <a:buNone/>
+              <a:defRPr sz="1723">
                 <a:solidFill>
                   <a:schemeClr val="tx1">
                     <a:tint val="75000"/>
@@ -945,9 +952,9 @@
                 </a:solidFill>
               </a:defRPr>
             </a:lvl6pPr>
-            <a:lvl7pPr marL="2057400" indent="0">
-              <a:buNone/>
-              <a:defRPr sz="1200">
+            <a:lvl7pPr marL="2954701" indent="0">
+              <a:buNone/>
+              <a:defRPr sz="1723">
                 <a:solidFill>
                   <a:schemeClr val="tx1">
                     <a:tint val="75000"/>
@@ -955,9 +962,9 @@
                 </a:solidFill>
               </a:defRPr>
             </a:lvl7pPr>
-            <a:lvl8pPr marL="2400300" indent="0">
-              <a:buNone/>
-              <a:defRPr sz="1200">
+            <a:lvl8pPr marL="3447151" indent="0">
+              <a:buNone/>
+              <a:defRPr sz="1723">
                 <a:solidFill>
                   <a:schemeClr val="tx1">
                     <a:tint val="75000"/>
@@ -965,9 +972,9 @@
                 </a:solidFill>
               </a:defRPr>
             </a:lvl8pPr>
-            <a:lvl9pPr marL="2743200" indent="0">
-              <a:buNone/>
-              <a:defRPr sz="1200">
+            <a:lvl9pPr marL="3939601" indent="0">
+              <a:buNone/>
+              <a:defRPr sz="1723">
                 <a:solidFill>
                   <a:schemeClr val="tx1">
                     <a:tint val="75000"/>
@@ -1002,7 +1009,7 @@
           <a:p>
             <a:fld id="{8B4270F6-19A4-4DCF-B5FF-17A8E016E4E6}" type="datetimeFigureOut">
               <a:rPr lang="de-DE" smtClean="0"/>
-              <a:t>01.09.2021</a:t>
+              <a:t>06.09.2021</a:t>
             </a:fld>
             <a:endParaRPr lang="de-DE"/>
           </a:p>
@@ -1053,7 +1060,7 @@
     </p:spTree>
     <p:extLst>
       <p:ext uri="{BB962C8B-B14F-4D97-AF65-F5344CB8AC3E}">
-        <p14:creationId xmlns:p14="http://schemas.microsoft.com/office/powerpoint/2010/main" val="3221829515"/>
+        <p14:creationId xmlns:p14="http://schemas.microsoft.com/office/powerpoint/2010/main" val="3349417111"/>
       </p:ext>
     </p:extLst>
   </p:cSld>
@@ -1115,8 +1122,8 @@
         </p:nvSpPr>
         <p:spPr>
           <a:xfrm>
-            <a:off x="471488" y="2637014"/>
-            <a:ext cx="2914650" cy="6285266"/>
+            <a:off x="1733699" y="1966350"/>
+            <a:ext cx="10717411" cy="4686754"/>
           </a:xfrm>
         </p:spPr>
         <p:txBody>
@@ -1172,8 +1179,8 @@
         </p:nvSpPr>
         <p:spPr>
           <a:xfrm>
-            <a:off x="3471863" y="2637014"/>
-            <a:ext cx="2914650" cy="6285266"/>
+            <a:off x="12766328" y="1966350"/>
+            <a:ext cx="10717411" cy="4686754"/>
           </a:xfrm>
         </p:spPr>
         <p:txBody>
@@ -1234,7 +1241,7 @@
           <a:p>
             <a:fld id="{8B4270F6-19A4-4DCF-B5FF-17A8E016E4E6}" type="datetimeFigureOut">
               <a:rPr lang="de-DE" smtClean="0"/>
-              <a:t>01.09.2021</a:t>
+              <a:t>06.09.2021</a:t>
             </a:fld>
             <a:endParaRPr lang="de-DE"/>
           </a:p>
@@ -1285,7 +1292,7 @@
     </p:spTree>
     <p:extLst>
       <p:ext uri="{BB962C8B-B14F-4D97-AF65-F5344CB8AC3E}">
-        <p14:creationId xmlns:p14="http://schemas.microsoft.com/office/powerpoint/2010/main" val="1007656798"/>
+        <p14:creationId xmlns:p14="http://schemas.microsoft.com/office/powerpoint/2010/main" val="22197268"/>
       </p:ext>
     </p:extLst>
   </p:cSld>
@@ -1324,8 +1331,8 @@
         </p:nvSpPr>
         <p:spPr>
           <a:xfrm>
-            <a:off x="472381" y="527405"/>
-            <a:ext cx="5915025" cy="1914702"/>
+            <a:off x="1736984" y="393271"/>
+            <a:ext cx="21750040" cy="1427742"/>
           </a:xfrm>
         </p:spPr>
         <p:txBody>
@@ -1352,8 +1359,8 @@
         </p:nvSpPr>
         <p:spPr>
           <a:xfrm>
-            <a:off x="472381" y="2428347"/>
-            <a:ext cx="2901255" cy="1190095"/>
+            <a:off x="1736985" y="1810753"/>
+            <a:ext cx="10668157" cy="887422"/>
           </a:xfrm>
         </p:spPr>
         <p:txBody>
@@ -1361,39 +1368,39 @@
           <a:lstStyle>
             <a:lvl1pPr marL="0" indent="0">
               <a:buNone/>
-              <a:defRPr sz="1800" b="1"/>
+              <a:defRPr sz="2585" b="1"/>
             </a:lvl1pPr>
-            <a:lvl2pPr marL="342900" indent="0">
-              <a:buNone/>
-              <a:defRPr sz="1500" b="1"/>
+            <a:lvl2pPr marL="492450" indent="0">
+              <a:buNone/>
+              <a:defRPr sz="2154" b="1"/>
             </a:lvl2pPr>
-            <a:lvl3pPr marL="685800" indent="0">
-              <a:buNone/>
-              <a:defRPr sz="1350" b="1"/>
+            <a:lvl3pPr marL="984900" indent="0">
+              <a:buNone/>
+              <a:defRPr sz="1939" b="1"/>
             </a:lvl3pPr>
-            <a:lvl4pPr marL="1028700" indent="0">
-              <a:buNone/>
-              <a:defRPr sz="1200" b="1"/>
+            <a:lvl4pPr marL="1477350" indent="0">
+              <a:buNone/>
+              <a:defRPr sz="1723" b="1"/>
             </a:lvl4pPr>
-            <a:lvl5pPr marL="1371600" indent="0">
-              <a:buNone/>
-              <a:defRPr sz="1200" b="1"/>
+            <a:lvl5pPr marL="1969800" indent="0">
+              <a:buNone/>
+              <a:defRPr sz="1723" b="1"/>
             </a:lvl5pPr>
-            <a:lvl6pPr marL="1714500" indent="0">
-              <a:buNone/>
-              <a:defRPr sz="1200" b="1"/>
+            <a:lvl6pPr marL="2462251" indent="0">
+              <a:buNone/>
+              <a:defRPr sz="1723" b="1"/>
             </a:lvl6pPr>
-            <a:lvl7pPr marL="2057400" indent="0">
-              <a:buNone/>
-              <a:defRPr sz="1200" b="1"/>
+            <a:lvl7pPr marL="2954701" indent="0">
+              <a:buNone/>
+              <a:defRPr sz="1723" b="1"/>
             </a:lvl7pPr>
-            <a:lvl8pPr marL="2400300" indent="0">
-              <a:buNone/>
-              <a:defRPr sz="1200" b="1"/>
+            <a:lvl8pPr marL="3447151" indent="0">
+              <a:buNone/>
+              <a:defRPr sz="1723" b="1"/>
             </a:lvl8pPr>
-            <a:lvl9pPr marL="2743200" indent="0">
-              <a:buNone/>
-              <a:defRPr sz="1200" b="1"/>
+            <a:lvl9pPr marL="3939601" indent="0">
+              <a:buNone/>
+              <a:defRPr sz="1723" b="1"/>
             </a:lvl9pPr>
           </a:lstStyle>
           <a:p>
@@ -1417,8 +1424,8 @@
         </p:nvSpPr>
         <p:spPr>
           <a:xfrm>
-            <a:off x="472381" y="3618442"/>
-            <a:ext cx="2901255" cy="5322183"/>
+            <a:off x="1736985" y="2698175"/>
+            <a:ext cx="10668157" cy="3968609"/>
           </a:xfrm>
         </p:spPr>
         <p:txBody>
@@ -1474,8 +1481,8 @@
         </p:nvSpPr>
         <p:spPr>
           <a:xfrm>
-            <a:off x="3471863" y="2428347"/>
-            <a:ext cx="2915543" cy="1190095"/>
+            <a:off x="12766328" y="1810753"/>
+            <a:ext cx="10720696" cy="887422"/>
           </a:xfrm>
         </p:spPr>
         <p:txBody>
@@ -1483,39 +1490,39 @@
           <a:lstStyle>
             <a:lvl1pPr marL="0" indent="0">
               <a:buNone/>
-              <a:defRPr sz="1800" b="1"/>
+              <a:defRPr sz="2585" b="1"/>
             </a:lvl1pPr>
-            <a:lvl2pPr marL="342900" indent="0">
-              <a:buNone/>
-              <a:defRPr sz="1500" b="1"/>
+            <a:lvl2pPr marL="492450" indent="0">
+              <a:buNone/>
+              <a:defRPr sz="2154" b="1"/>
             </a:lvl2pPr>
-            <a:lvl3pPr marL="685800" indent="0">
-              <a:buNone/>
-              <a:defRPr sz="1350" b="1"/>
+            <a:lvl3pPr marL="984900" indent="0">
+              <a:buNone/>
+              <a:defRPr sz="1939" b="1"/>
             </a:lvl3pPr>
-            <a:lvl4pPr marL="1028700" indent="0">
-              <a:buNone/>
-              <a:defRPr sz="1200" b="1"/>
+            <a:lvl4pPr marL="1477350" indent="0">
+              <a:buNone/>
+              <a:defRPr sz="1723" b="1"/>
             </a:lvl4pPr>
-            <a:lvl5pPr marL="1371600" indent="0">
-              <a:buNone/>
-              <a:defRPr sz="1200" b="1"/>
+            <a:lvl5pPr marL="1969800" indent="0">
+              <a:buNone/>
+              <a:defRPr sz="1723" b="1"/>
             </a:lvl5pPr>
-            <a:lvl6pPr marL="1714500" indent="0">
-              <a:buNone/>
-              <a:defRPr sz="1200" b="1"/>
+            <a:lvl6pPr marL="2462251" indent="0">
+              <a:buNone/>
+              <a:defRPr sz="1723" b="1"/>
             </a:lvl6pPr>
-            <a:lvl7pPr marL="2057400" indent="0">
-              <a:buNone/>
-              <a:defRPr sz="1200" b="1"/>
+            <a:lvl7pPr marL="2954701" indent="0">
+              <a:buNone/>
+              <a:defRPr sz="1723" b="1"/>
             </a:lvl7pPr>
-            <a:lvl8pPr marL="2400300" indent="0">
-              <a:buNone/>
-              <a:defRPr sz="1200" b="1"/>
+            <a:lvl8pPr marL="3447151" indent="0">
+              <a:buNone/>
+              <a:defRPr sz="1723" b="1"/>
             </a:lvl8pPr>
-            <a:lvl9pPr marL="2743200" indent="0">
-              <a:buNone/>
-              <a:defRPr sz="1200" b="1"/>
+            <a:lvl9pPr marL="3939601" indent="0">
+              <a:buNone/>
+              <a:defRPr sz="1723" b="1"/>
             </a:lvl9pPr>
           </a:lstStyle>
           <a:p>
@@ -1539,8 +1546,8 @@
         </p:nvSpPr>
         <p:spPr>
           <a:xfrm>
-            <a:off x="3471863" y="3618442"/>
-            <a:ext cx="2915543" cy="5322183"/>
+            <a:off x="12766328" y="2698175"/>
+            <a:ext cx="10720696" cy="3968609"/>
           </a:xfrm>
         </p:spPr>
         <p:txBody>
@@ -1601,7 +1608,7 @@
           <a:p>
             <a:fld id="{8B4270F6-19A4-4DCF-B5FF-17A8E016E4E6}" type="datetimeFigureOut">
               <a:rPr lang="de-DE" smtClean="0"/>
-              <a:t>01.09.2021</a:t>
+              <a:t>06.09.2021</a:t>
             </a:fld>
             <a:endParaRPr lang="de-DE"/>
           </a:p>
@@ -1652,7 +1659,7 @@
     </p:spTree>
     <p:extLst>
       <p:ext uri="{BB962C8B-B14F-4D97-AF65-F5344CB8AC3E}">
-        <p14:creationId xmlns:p14="http://schemas.microsoft.com/office/powerpoint/2010/main" val="1720879694"/>
+        <p14:creationId xmlns:p14="http://schemas.microsoft.com/office/powerpoint/2010/main" val="1278018866"/>
       </p:ext>
     </p:extLst>
   </p:cSld>
@@ -1719,7 +1726,7 @@
           <a:p>
             <a:fld id="{8B4270F6-19A4-4DCF-B5FF-17A8E016E4E6}" type="datetimeFigureOut">
               <a:rPr lang="de-DE" smtClean="0"/>
-              <a:t>01.09.2021</a:t>
+              <a:t>06.09.2021</a:t>
             </a:fld>
             <a:endParaRPr lang="de-DE"/>
           </a:p>
@@ -1770,7 +1777,7 @@
     </p:spTree>
     <p:extLst>
       <p:ext uri="{BB962C8B-B14F-4D97-AF65-F5344CB8AC3E}">
-        <p14:creationId xmlns:p14="http://schemas.microsoft.com/office/powerpoint/2010/main" val="3375340941"/>
+        <p14:creationId xmlns:p14="http://schemas.microsoft.com/office/powerpoint/2010/main" val="2970794854"/>
       </p:ext>
     </p:extLst>
   </p:cSld>
@@ -1814,7 +1821,7 @@
           <a:p>
             <a:fld id="{8B4270F6-19A4-4DCF-B5FF-17A8E016E4E6}" type="datetimeFigureOut">
               <a:rPr lang="de-DE" smtClean="0"/>
-              <a:t>01.09.2021</a:t>
+              <a:t>06.09.2021</a:t>
             </a:fld>
             <a:endParaRPr lang="de-DE"/>
           </a:p>
@@ -1865,7 +1872,7 @@
     </p:spTree>
     <p:extLst>
       <p:ext uri="{BB962C8B-B14F-4D97-AF65-F5344CB8AC3E}">
-        <p14:creationId xmlns:p14="http://schemas.microsoft.com/office/powerpoint/2010/main" val="4091826097"/>
+        <p14:creationId xmlns:p14="http://schemas.microsoft.com/office/powerpoint/2010/main" val="3032740910"/>
       </p:ext>
     </p:extLst>
   </p:cSld>
@@ -1904,15 +1911,15 @@
         </p:nvSpPr>
         <p:spPr>
           <a:xfrm>
-            <a:off x="472381" y="660400"/>
-            <a:ext cx="2211884" cy="2311400"/>
+            <a:off x="1736985" y="492442"/>
+            <a:ext cx="8133279" cy="1723549"/>
           </a:xfrm>
         </p:spPr>
         <p:txBody>
           <a:bodyPr anchor="b"/>
           <a:lstStyle>
             <a:lvl1pPr>
-              <a:defRPr sz="2400"/>
+              <a:defRPr sz="3447"/>
             </a:lvl1pPr>
           </a:lstStyle>
           <a:p>
@@ -1936,39 +1943,39 @@
         </p:nvSpPr>
         <p:spPr>
           <a:xfrm>
-            <a:off x="2915543" y="1426283"/>
-            <a:ext cx="3471863" cy="7039681"/>
+            <a:off x="10720696" y="1063539"/>
+            <a:ext cx="12766328" cy="5249301"/>
           </a:xfrm>
         </p:spPr>
         <p:txBody>
           <a:bodyPr/>
           <a:lstStyle>
             <a:lvl1pPr>
-              <a:defRPr sz="2400"/>
+              <a:defRPr sz="3447"/>
             </a:lvl1pPr>
             <a:lvl2pPr>
-              <a:defRPr sz="2100"/>
+              <a:defRPr sz="3016"/>
             </a:lvl2pPr>
             <a:lvl3pPr>
-              <a:defRPr sz="1800"/>
+              <a:defRPr sz="2585"/>
             </a:lvl3pPr>
             <a:lvl4pPr>
-              <a:defRPr sz="1500"/>
+              <a:defRPr sz="2154"/>
             </a:lvl4pPr>
             <a:lvl5pPr>
-              <a:defRPr sz="1500"/>
+              <a:defRPr sz="2154"/>
             </a:lvl5pPr>
             <a:lvl6pPr>
-              <a:defRPr sz="1500"/>
+              <a:defRPr sz="2154"/>
             </a:lvl6pPr>
             <a:lvl7pPr>
-              <a:defRPr sz="1500"/>
+              <a:defRPr sz="2154"/>
             </a:lvl7pPr>
             <a:lvl8pPr>
-              <a:defRPr sz="1500"/>
+              <a:defRPr sz="2154"/>
             </a:lvl8pPr>
             <a:lvl9pPr>
-              <a:defRPr sz="1500"/>
+              <a:defRPr sz="2154"/>
             </a:lvl9pPr>
           </a:lstStyle>
           <a:p>
@@ -2021,8 +2028,8 @@
         </p:nvSpPr>
         <p:spPr>
           <a:xfrm>
-            <a:off x="472381" y="2971800"/>
-            <a:ext cx="2211884" cy="5505627"/>
+            <a:off x="1736985" y="2215991"/>
+            <a:ext cx="8133279" cy="4105398"/>
           </a:xfrm>
         </p:spPr>
         <p:txBody>
@@ -2030,39 +2037,39 @@
           <a:lstStyle>
             <a:lvl1pPr marL="0" indent="0">
               <a:buNone/>
-              <a:defRPr sz="1200"/>
+              <a:defRPr sz="1723"/>
             </a:lvl1pPr>
-            <a:lvl2pPr marL="342900" indent="0">
-              <a:buNone/>
-              <a:defRPr sz="1050"/>
+            <a:lvl2pPr marL="492450" indent="0">
+              <a:buNone/>
+              <a:defRPr sz="1508"/>
             </a:lvl2pPr>
-            <a:lvl3pPr marL="685800" indent="0">
-              <a:buNone/>
-              <a:defRPr sz="900"/>
+            <a:lvl3pPr marL="984900" indent="0">
+              <a:buNone/>
+              <a:defRPr sz="1293"/>
             </a:lvl3pPr>
-            <a:lvl4pPr marL="1028700" indent="0">
-              <a:buNone/>
-              <a:defRPr sz="750"/>
+            <a:lvl4pPr marL="1477350" indent="0">
+              <a:buNone/>
+              <a:defRPr sz="1077"/>
             </a:lvl4pPr>
-            <a:lvl5pPr marL="1371600" indent="0">
-              <a:buNone/>
-              <a:defRPr sz="750"/>
+            <a:lvl5pPr marL="1969800" indent="0">
+              <a:buNone/>
+              <a:defRPr sz="1077"/>
             </a:lvl5pPr>
-            <a:lvl6pPr marL="1714500" indent="0">
-              <a:buNone/>
-              <a:defRPr sz="750"/>
+            <a:lvl6pPr marL="2462251" indent="0">
+              <a:buNone/>
+              <a:defRPr sz="1077"/>
             </a:lvl6pPr>
-            <a:lvl7pPr marL="2057400" indent="0">
-              <a:buNone/>
-              <a:defRPr sz="750"/>
+            <a:lvl7pPr marL="2954701" indent="0">
+              <a:buNone/>
+              <a:defRPr sz="1077"/>
             </a:lvl7pPr>
-            <a:lvl8pPr marL="2400300" indent="0">
-              <a:buNone/>
-              <a:defRPr sz="750"/>
+            <a:lvl8pPr marL="3447151" indent="0">
+              <a:buNone/>
+              <a:defRPr sz="1077"/>
             </a:lvl8pPr>
-            <a:lvl9pPr marL="2743200" indent="0">
-              <a:buNone/>
-              <a:defRPr sz="750"/>
+            <a:lvl9pPr marL="3939601" indent="0">
+              <a:buNone/>
+              <a:defRPr sz="1077"/>
             </a:lvl9pPr>
           </a:lstStyle>
           <a:p>
@@ -2091,7 +2098,7 @@
           <a:p>
             <a:fld id="{8B4270F6-19A4-4DCF-B5FF-17A8E016E4E6}" type="datetimeFigureOut">
               <a:rPr lang="de-DE" smtClean="0"/>
-              <a:t>01.09.2021</a:t>
+              <a:t>06.09.2021</a:t>
             </a:fld>
             <a:endParaRPr lang="de-DE"/>
           </a:p>
@@ -2142,7 +2149,7 @@
     </p:spTree>
     <p:extLst>
       <p:ext uri="{BB962C8B-B14F-4D97-AF65-F5344CB8AC3E}">
-        <p14:creationId xmlns:p14="http://schemas.microsoft.com/office/powerpoint/2010/main" val="1726851779"/>
+        <p14:creationId xmlns:p14="http://schemas.microsoft.com/office/powerpoint/2010/main" val="2059500029"/>
       </p:ext>
     </p:extLst>
   </p:cSld>
@@ -2181,15 +2188,15 @@
         </p:nvSpPr>
         <p:spPr>
           <a:xfrm>
-            <a:off x="472381" y="660400"/>
-            <a:ext cx="2211884" cy="2311400"/>
+            <a:off x="1736985" y="492442"/>
+            <a:ext cx="8133279" cy="1723549"/>
           </a:xfrm>
         </p:spPr>
         <p:txBody>
           <a:bodyPr anchor="b"/>
           <a:lstStyle>
             <a:lvl1pPr>
-              <a:defRPr sz="2400"/>
+              <a:defRPr sz="3447"/>
             </a:lvl1pPr>
           </a:lstStyle>
           <a:p>
@@ -2213,8 +2220,8 @@
         </p:nvSpPr>
         <p:spPr>
           <a:xfrm>
-            <a:off x="2915543" y="1426283"/>
-            <a:ext cx="3471863" cy="7039681"/>
+            <a:off x="10720696" y="1063539"/>
+            <a:ext cx="12766328" cy="5249301"/>
           </a:xfrm>
         </p:spPr>
         <p:txBody>
@@ -2222,39 +2229,39 @@
           <a:lstStyle>
             <a:lvl1pPr marL="0" indent="0">
               <a:buNone/>
-              <a:defRPr sz="2400"/>
+              <a:defRPr sz="3447"/>
             </a:lvl1pPr>
-            <a:lvl2pPr marL="342900" indent="0">
-              <a:buNone/>
-              <a:defRPr sz="2100"/>
+            <a:lvl2pPr marL="492450" indent="0">
+              <a:buNone/>
+              <a:defRPr sz="3016"/>
             </a:lvl2pPr>
-            <a:lvl3pPr marL="685800" indent="0">
-              <a:buNone/>
-              <a:defRPr sz="1800"/>
+            <a:lvl3pPr marL="984900" indent="0">
+              <a:buNone/>
+              <a:defRPr sz="2585"/>
             </a:lvl3pPr>
-            <a:lvl4pPr marL="1028700" indent="0">
-              <a:buNone/>
-              <a:defRPr sz="1500"/>
+            <a:lvl4pPr marL="1477350" indent="0">
+              <a:buNone/>
+              <a:defRPr sz="2154"/>
             </a:lvl4pPr>
-            <a:lvl5pPr marL="1371600" indent="0">
-              <a:buNone/>
-              <a:defRPr sz="1500"/>
+            <a:lvl5pPr marL="1969800" indent="0">
+              <a:buNone/>
+              <a:defRPr sz="2154"/>
             </a:lvl5pPr>
-            <a:lvl6pPr marL="1714500" indent="0">
-              <a:buNone/>
-              <a:defRPr sz="1500"/>
+            <a:lvl6pPr marL="2462251" indent="0">
+              <a:buNone/>
+              <a:defRPr sz="2154"/>
             </a:lvl6pPr>
-            <a:lvl7pPr marL="2057400" indent="0">
-              <a:buNone/>
-              <a:defRPr sz="1500"/>
+            <a:lvl7pPr marL="2954701" indent="0">
+              <a:buNone/>
+              <a:defRPr sz="2154"/>
             </a:lvl7pPr>
-            <a:lvl8pPr marL="2400300" indent="0">
-              <a:buNone/>
-              <a:defRPr sz="1500"/>
+            <a:lvl8pPr marL="3447151" indent="0">
+              <a:buNone/>
+              <a:defRPr sz="2154"/>
             </a:lvl8pPr>
-            <a:lvl9pPr marL="2743200" indent="0">
-              <a:buNone/>
-              <a:defRPr sz="1500"/>
+            <a:lvl9pPr marL="3939601" indent="0">
+              <a:buNone/>
+              <a:defRPr sz="2154"/>
             </a:lvl9pPr>
           </a:lstStyle>
           <a:p>
@@ -2278,8 +2285,8 @@
         </p:nvSpPr>
         <p:spPr>
           <a:xfrm>
-            <a:off x="472381" y="2971800"/>
-            <a:ext cx="2211884" cy="5505627"/>
+            <a:off x="1736985" y="2215991"/>
+            <a:ext cx="8133279" cy="4105398"/>
           </a:xfrm>
         </p:spPr>
         <p:txBody>
@@ -2287,39 +2294,39 @@
           <a:lstStyle>
             <a:lvl1pPr marL="0" indent="0">
               <a:buNone/>
-              <a:defRPr sz="1200"/>
+              <a:defRPr sz="1723"/>
             </a:lvl1pPr>
-            <a:lvl2pPr marL="342900" indent="0">
-              <a:buNone/>
-              <a:defRPr sz="1050"/>
+            <a:lvl2pPr marL="492450" indent="0">
+              <a:buNone/>
+              <a:defRPr sz="1508"/>
             </a:lvl2pPr>
-            <a:lvl3pPr marL="685800" indent="0">
-              <a:buNone/>
-              <a:defRPr sz="900"/>
+            <a:lvl3pPr marL="984900" indent="0">
+              <a:buNone/>
+              <a:defRPr sz="1293"/>
             </a:lvl3pPr>
-            <a:lvl4pPr marL="1028700" indent="0">
-              <a:buNone/>
-              <a:defRPr sz="750"/>
+            <a:lvl4pPr marL="1477350" indent="0">
+              <a:buNone/>
+              <a:defRPr sz="1077"/>
             </a:lvl4pPr>
-            <a:lvl5pPr marL="1371600" indent="0">
-              <a:buNone/>
-              <a:defRPr sz="750"/>
+            <a:lvl5pPr marL="1969800" indent="0">
+              <a:buNone/>
+              <a:defRPr sz="1077"/>
             </a:lvl5pPr>
-            <a:lvl6pPr marL="1714500" indent="0">
-              <a:buNone/>
-              <a:defRPr sz="750"/>
+            <a:lvl6pPr marL="2462251" indent="0">
+              <a:buNone/>
+              <a:defRPr sz="1077"/>
             </a:lvl6pPr>
-            <a:lvl7pPr marL="2057400" indent="0">
-              <a:buNone/>
-              <a:defRPr sz="750"/>
+            <a:lvl7pPr marL="2954701" indent="0">
+              <a:buNone/>
+              <a:defRPr sz="1077"/>
             </a:lvl7pPr>
-            <a:lvl8pPr marL="2400300" indent="0">
-              <a:buNone/>
-              <a:defRPr sz="750"/>
+            <a:lvl8pPr marL="3447151" indent="0">
+              <a:buNone/>
+              <a:defRPr sz="1077"/>
             </a:lvl8pPr>
-            <a:lvl9pPr marL="2743200" indent="0">
-              <a:buNone/>
-              <a:defRPr sz="750"/>
+            <a:lvl9pPr marL="3939601" indent="0">
+              <a:buNone/>
+              <a:defRPr sz="1077"/>
             </a:lvl9pPr>
           </a:lstStyle>
           <a:p>
@@ -2348,7 +2355,7 @@
           <a:p>
             <a:fld id="{8B4270F6-19A4-4DCF-B5FF-17A8E016E4E6}" type="datetimeFigureOut">
               <a:rPr lang="de-DE" smtClean="0"/>
-              <a:t>01.09.2021</a:t>
+              <a:t>06.09.2021</a:t>
             </a:fld>
             <a:endParaRPr lang="de-DE"/>
           </a:p>
@@ -2399,7 +2406,7 @@
     </p:spTree>
     <p:extLst>
       <p:ext uri="{BB962C8B-B14F-4D97-AF65-F5344CB8AC3E}">
-        <p14:creationId xmlns:p14="http://schemas.microsoft.com/office/powerpoint/2010/main" val="3666399095"/>
+        <p14:creationId xmlns:p14="http://schemas.microsoft.com/office/powerpoint/2010/main" val="3599195969"/>
       </p:ext>
     </p:extLst>
   </p:cSld>
@@ -2443,8 +2450,8 @@
         </p:nvSpPr>
         <p:spPr>
           <a:xfrm>
-            <a:off x="471488" y="527405"/>
-            <a:ext cx="5915025" cy="1914702"/>
+            <a:off x="1733699" y="393271"/>
+            <a:ext cx="21750040" cy="1427742"/>
           </a:xfrm>
           <a:prstGeom prst="rect">
             <a:avLst/>
@@ -2476,8 +2483,8 @@
         </p:nvSpPr>
         <p:spPr>
           <a:xfrm>
-            <a:off x="471488" y="2637014"/>
-            <a:ext cx="5915025" cy="6285266"/>
+            <a:off x="1733699" y="1966350"/>
+            <a:ext cx="21750040" cy="4686754"/>
           </a:xfrm>
           <a:prstGeom prst="rect">
             <a:avLst/>
@@ -2538,8 +2545,8 @@
         </p:nvSpPr>
         <p:spPr>
           <a:xfrm>
-            <a:off x="471488" y="9181397"/>
-            <a:ext cx="1543050" cy="527403"/>
+            <a:off x="1733699" y="6846320"/>
+            <a:ext cx="5673924" cy="393270"/>
           </a:xfrm>
           <a:prstGeom prst="rect">
             <a:avLst/>
@@ -2549,7 +2556,7 @@
           <a:bodyPr vert="horz" lIns="91440" tIns="45720" rIns="91440" bIns="45720" rtlCol="0" anchor="ctr"/>
           <a:lstStyle>
             <a:lvl1pPr algn="l">
-              <a:defRPr sz="900">
+              <a:defRPr sz="1293">
                 <a:solidFill>
                   <a:schemeClr val="tx1">
                     <a:tint val="75000"/>
@@ -2561,7 +2568,7 @@
           <a:p>
             <a:fld id="{8B4270F6-19A4-4DCF-B5FF-17A8E016E4E6}" type="datetimeFigureOut">
               <a:rPr lang="de-DE" smtClean="0"/>
-              <a:t>01.09.2021</a:t>
+              <a:t>06.09.2021</a:t>
             </a:fld>
             <a:endParaRPr lang="de-DE"/>
           </a:p>
@@ -2579,8 +2586,8 @@
         </p:nvSpPr>
         <p:spPr>
           <a:xfrm>
-            <a:off x="2271713" y="9181397"/>
-            <a:ext cx="2314575" cy="527403"/>
+            <a:off x="8353277" y="6846320"/>
+            <a:ext cx="8510885" cy="393270"/>
           </a:xfrm>
           <a:prstGeom prst="rect">
             <a:avLst/>
@@ -2590,7 +2597,7 @@
           <a:bodyPr vert="horz" lIns="91440" tIns="45720" rIns="91440" bIns="45720" rtlCol="0" anchor="ctr"/>
           <a:lstStyle>
             <a:lvl1pPr algn="ctr">
-              <a:defRPr sz="900">
+              <a:defRPr sz="1293">
                 <a:solidFill>
                   <a:schemeClr val="tx1">
                     <a:tint val="75000"/>
@@ -2616,8 +2623,8 @@
         </p:nvSpPr>
         <p:spPr>
           <a:xfrm>
-            <a:off x="4843463" y="9181397"/>
-            <a:ext cx="1543050" cy="527403"/>
+            <a:off x="17809815" y="6846320"/>
+            <a:ext cx="5673924" cy="393270"/>
           </a:xfrm>
           <a:prstGeom prst="rect">
             <a:avLst/>
@@ -2627,7 +2634,7 @@
           <a:bodyPr vert="horz" lIns="91440" tIns="45720" rIns="91440" bIns="45720" rtlCol="0" anchor="ctr"/>
           <a:lstStyle>
             <a:lvl1pPr algn="r">
-              <a:defRPr sz="900">
+              <a:defRPr sz="1293">
                 <a:solidFill>
                   <a:schemeClr val="tx1">
                     <a:tint val="75000"/>
@@ -2648,27 +2655,27 @@
     </p:spTree>
     <p:extLst>
       <p:ext uri="{BB962C8B-B14F-4D97-AF65-F5344CB8AC3E}">
-        <p14:creationId xmlns:p14="http://schemas.microsoft.com/office/powerpoint/2010/main" val="3718617100"/>
+        <p14:creationId xmlns:p14="http://schemas.microsoft.com/office/powerpoint/2010/main" val="2407892834"/>
       </p:ext>
     </p:extLst>
   </p:cSld>
   <p:clrMap bg1="lt1" tx1="dk1" bg2="lt2" tx2="dk2" accent1="accent1" accent2="accent2" accent3="accent3" accent4="accent4" accent5="accent5" accent6="accent6" hlink="hlink" folHlink="folHlink"/>
   <p:sldLayoutIdLst>
-    <p:sldLayoutId id="2147483661" r:id="rId1"/>
-    <p:sldLayoutId id="2147483662" r:id="rId2"/>
-    <p:sldLayoutId id="2147483663" r:id="rId3"/>
-    <p:sldLayoutId id="2147483664" r:id="rId4"/>
-    <p:sldLayoutId id="2147483665" r:id="rId5"/>
-    <p:sldLayoutId id="2147483666" r:id="rId6"/>
-    <p:sldLayoutId id="2147483667" r:id="rId7"/>
-    <p:sldLayoutId id="2147483668" r:id="rId8"/>
-    <p:sldLayoutId id="2147483669" r:id="rId9"/>
-    <p:sldLayoutId id="2147483670" r:id="rId10"/>
-    <p:sldLayoutId id="2147483671" r:id="rId11"/>
+    <p:sldLayoutId id="2147483697" r:id="rId1"/>
+    <p:sldLayoutId id="2147483698" r:id="rId2"/>
+    <p:sldLayoutId id="2147483699" r:id="rId3"/>
+    <p:sldLayoutId id="2147483700" r:id="rId4"/>
+    <p:sldLayoutId id="2147483701" r:id="rId5"/>
+    <p:sldLayoutId id="2147483702" r:id="rId6"/>
+    <p:sldLayoutId id="2147483703" r:id="rId7"/>
+    <p:sldLayoutId id="2147483704" r:id="rId8"/>
+    <p:sldLayoutId id="2147483705" r:id="rId9"/>
+    <p:sldLayoutId id="2147483706" r:id="rId10"/>
+    <p:sldLayoutId id="2147483707" r:id="rId11"/>
   </p:sldLayoutIdLst>
   <p:txStyles>
     <p:titleStyle>
-      <a:lvl1pPr algn="l" defTabSz="685800" rtl="0" eaLnBrk="1" latinLnBrk="0" hangingPunct="1">
+      <a:lvl1pPr algn="l" defTabSz="984900" rtl="0" eaLnBrk="1" latinLnBrk="0" hangingPunct="1">
         <a:lnSpc>
           <a:spcPct val="90000"/>
         </a:lnSpc>
@@ -2676,7 +2683,7 @@
           <a:spcPct val="0"/>
         </a:spcBef>
         <a:buNone/>
-        <a:defRPr sz="3300" kern="1200">
+        <a:defRPr sz="4739" kern="1200">
           <a:solidFill>
             <a:schemeClr val="tx1"/>
           </a:solidFill>
@@ -2687,16 +2694,16 @@
       </a:lvl1pPr>
     </p:titleStyle>
     <p:bodyStyle>
-      <a:lvl1pPr marL="171450" indent="-171450" algn="l" defTabSz="685800" rtl="0" eaLnBrk="1" latinLnBrk="0" hangingPunct="1">
+      <a:lvl1pPr marL="246225" indent="-246225" algn="l" defTabSz="984900" rtl="0" eaLnBrk="1" latinLnBrk="0" hangingPunct="1">
         <a:lnSpc>
           <a:spcPct val="90000"/>
         </a:lnSpc>
         <a:spcBef>
-          <a:spcPts val="750"/>
+          <a:spcPts val="1077"/>
         </a:spcBef>
         <a:buFont typeface="Arial" panose="020B0604020202020204" pitchFamily="34" charset="0"/>
         <a:buChar char="•"/>
-        <a:defRPr sz="2100" kern="1200">
+        <a:defRPr sz="3016" kern="1200">
           <a:solidFill>
             <a:schemeClr val="tx1"/>
           </a:solidFill>
@@ -2705,16 +2712,16 @@
           <a:cs typeface="+mn-cs"/>
         </a:defRPr>
       </a:lvl1pPr>
-      <a:lvl2pPr marL="514350" indent="-171450" algn="l" defTabSz="685800" rtl="0" eaLnBrk="1" latinLnBrk="0" hangingPunct="1">
+      <a:lvl2pPr marL="738675" indent="-246225" algn="l" defTabSz="984900" rtl="0" eaLnBrk="1" latinLnBrk="0" hangingPunct="1">
         <a:lnSpc>
           <a:spcPct val="90000"/>
         </a:lnSpc>
         <a:spcBef>
-          <a:spcPts val="375"/>
+          <a:spcPts val="539"/>
         </a:spcBef>
         <a:buFont typeface="Arial" panose="020B0604020202020204" pitchFamily="34" charset="0"/>
         <a:buChar char="•"/>
-        <a:defRPr sz="1800" kern="1200">
+        <a:defRPr sz="2585" kern="1200">
           <a:solidFill>
             <a:schemeClr val="tx1"/>
           </a:solidFill>
@@ -2723,16 +2730,16 @@
           <a:cs typeface="+mn-cs"/>
         </a:defRPr>
       </a:lvl2pPr>
-      <a:lvl3pPr marL="857250" indent="-171450" algn="l" defTabSz="685800" rtl="0" eaLnBrk="1" latinLnBrk="0" hangingPunct="1">
+      <a:lvl3pPr marL="1231125" indent="-246225" algn="l" defTabSz="984900" rtl="0" eaLnBrk="1" latinLnBrk="0" hangingPunct="1">
         <a:lnSpc>
           <a:spcPct val="90000"/>
         </a:lnSpc>
         <a:spcBef>
-          <a:spcPts val="375"/>
+          <a:spcPts val="539"/>
         </a:spcBef>
         <a:buFont typeface="Arial" panose="020B0604020202020204" pitchFamily="34" charset="0"/>
         <a:buChar char="•"/>
-        <a:defRPr sz="1500" kern="1200">
+        <a:defRPr sz="2154" kern="1200">
           <a:solidFill>
             <a:schemeClr val="tx1"/>
           </a:solidFill>
@@ -2741,16 +2748,16 @@
           <a:cs typeface="+mn-cs"/>
         </a:defRPr>
       </a:lvl3pPr>
-      <a:lvl4pPr marL="1200150" indent="-171450" algn="l" defTabSz="685800" rtl="0" eaLnBrk="1" latinLnBrk="0" hangingPunct="1">
+      <a:lvl4pPr marL="1723575" indent="-246225" algn="l" defTabSz="984900" rtl="0" eaLnBrk="1" latinLnBrk="0" hangingPunct="1">
         <a:lnSpc>
           <a:spcPct val="90000"/>
         </a:lnSpc>
         <a:spcBef>
-          <a:spcPts val="375"/>
+          <a:spcPts val="539"/>
         </a:spcBef>
         <a:buFont typeface="Arial" panose="020B0604020202020204" pitchFamily="34" charset="0"/>
         <a:buChar char="•"/>
-        <a:defRPr sz="1350" kern="1200">
+        <a:defRPr sz="1939" kern="1200">
           <a:solidFill>
             <a:schemeClr val="tx1"/>
           </a:solidFill>
@@ -2759,16 +2766,16 @@
           <a:cs typeface="+mn-cs"/>
         </a:defRPr>
       </a:lvl4pPr>
-      <a:lvl5pPr marL="1543050" indent="-171450" algn="l" defTabSz="685800" rtl="0" eaLnBrk="1" latinLnBrk="0" hangingPunct="1">
+      <a:lvl5pPr marL="2216026" indent="-246225" algn="l" defTabSz="984900" rtl="0" eaLnBrk="1" latinLnBrk="0" hangingPunct="1">
         <a:lnSpc>
           <a:spcPct val="90000"/>
         </a:lnSpc>
         <a:spcBef>
-          <a:spcPts val="375"/>
+          <a:spcPts val="539"/>
         </a:spcBef>
         <a:buFont typeface="Arial" panose="020B0604020202020204" pitchFamily="34" charset="0"/>
         <a:buChar char="•"/>
-        <a:defRPr sz="1350" kern="1200">
+        <a:defRPr sz="1939" kern="1200">
           <a:solidFill>
             <a:schemeClr val="tx1"/>
           </a:solidFill>
@@ -2777,16 +2784,16 @@
           <a:cs typeface="+mn-cs"/>
         </a:defRPr>
       </a:lvl5pPr>
-      <a:lvl6pPr marL="1885950" indent="-171450" algn="l" defTabSz="685800" rtl="0" eaLnBrk="1" latinLnBrk="0" hangingPunct="1">
+      <a:lvl6pPr marL="2708476" indent="-246225" algn="l" defTabSz="984900" rtl="0" eaLnBrk="1" latinLnBrk="0" hangingPunct="1">
         <a:lnSpc>
           <a:spcPct val="90000"/>
         </a:lnSpc>
         <a:spcBef>
-          <a:spcPts val="375"/>
+          <a:spcPts val="539"/>
         </a:spcBef>
         <a:buFont typeface="Arial" panose="020B0604020202020204" pitchFamily="34" charset="0"/>
         <a:buChar char="•"/>
-        <a:defRPr sz="1350" kern="1200">
+        <a:defRPr sz="1939" kern="1200">
           <a:solidFill>
             <a:schemeClr val="tx1"/>
           </a:solidFill>
@@ -2795,16 +2802,16 @@
           <a:cs typeface="+mn-cs"/>
         </a:defRPr>
       </a:lvl6pPr>
-      <a:lvl7pPr marL="2228850" indent="-171450" algn="l" defTabSz="685800" rtl="0" eaLnBrk="1" latinLnBrk="0" hangingPunct="1">
+      <a:lvl7pPr marL="3200926" indent="-246225" algn="l" defTabSz="984900" rtl="0" eaLnBrk="1" latinLnBrk="0" hangingPunct="1">
         <a:lnSpc>
           <a:spcPct val="90000"/>
         </a:lnSpc>
         <a:spcBef>
-          <a:spcPts val="375"/>
+          <a:spcPts val="539"/>
         </a:spcBef>
         <a:buFont typeface="Arial" panose="020B0604020202020204" pitchFamily="34" charset="0"/>
         <a:buChar char="•"/>
-        <a:defRPr sz="1350" kern="1200">
+        <a:defRPr sz="1939" kern="1200">
           <a:solidFill>
             <a:schemeClr val="tx1"/>
           </a:solidFill>
@@ -2813,16 +2820,16 @@
           <a:cs typeface="+mn-cs"/>
         </a:defRPr>
       </a:lvl7pPr>
-      <a:lvl8pPr marL="2571750" indent="-171450" algn="l" defTabSz="685800" rtl="0" eaLnBrk="1" latinLnBrk="0" hangingPunct="1">
+      <a:lvl8pPr marL="3693376" indent="-246225" algn="l" defTabSz="984900" rtl="0" eaLnBrk="1" latinLnBrk="0" hangingPunct="1">
         <a:lnSpc>
           <a:spcPct val="90000"/>
         </a:lnSpc>
         <a:spcBef>
-          <a:spcPts val="375"/>
+          <a:spcPts val="539"/>
         </a:spcBef>
         <a:buFont typeface="Arial" panose="020B0604020202020204" pitchFamily="34" charset="0"/>
         <a:buChar char="•"/>
-        <a:defRPr sz="1350" kern="1200">
+        <a:defRPr sz="1939" kern="1200">
           <a:solidFill>
             <a:schemeClr val="tx1"/>
           </a:solidFill>
@@ -2831,16 +2838,16 @@
           <a:cs typeface="+mn-cs"/>
         </a:defRPr>
       </a:lvl8pPr>
-      <a:lvl9pPr marL="2914650" indent="-171450" algn="l" defTabSz="685800" rtl="0" eaLnBrk="1" latinLnBrk="0" hangingPunct="1">
+      <a:lvl9pPr marL="4185826" indent="-246225" algn="l" defTabSz="984900" rtl="0" eaLnBrk="1" latinLnBrk="0" hangingPunct="1">
         <a:lnSpc>
           <a:spcPct val="90000"/>
         </a:lnSpc>
         <a:spcBef>
-          <a:spcPts val="375"/>
+          <a:spcPts val="539"/>
         </a:spcBef>
         <a:buFont typeface="Arial" panose="020B0604020202020204" pitchFamily="34" charset="0"/>
         <a:buChar char="•"/>
-        <a:defRPr sz="1350" kern="1200">
+        <a:defRPr sz="1939" kern="1200">
           <a:solidFill>
             <a:schemeClr val="tx1"/>
           </a:solidFill>
@@ -2854,8 +2861,8 @@
       <a:defPPr>
         <a:defRPr lang="en-US"/>
       </a:defPPr>
-      <a:lvl1pPr marL="0" algn="l" defTabSz="685800" rtl="0" eaLnBrk="1" latinLnBrk="0" hangingPunct="1">
-        <a:defRPr sz="1350" kern="1200">
+      <a:lvl1pPr marL="0" algn="l" defTabSz="984900" rtl="0" eaLnBrk="1" latinLnBrk="0" hangingPunct="1">
+        <a:defRPr sz="1939" kern="1200">
           <a:solidFill>
             <a:schemeClr val="tx1"/>
           </a:solidFill>
@@ -2864,8 +2871,8 @@
           <a:cs typeface="+mn-cs"/>
         </a:defRPr>
       </a:lvl1pPr>
-      <a:lvl2pPr marL="342900" algn="l" defTabSz="685800" rtl="0" eaLnBrk="1" latinLnBrk="0" hangingPunct="1">
-        <a:defRPr sz="1350" kern="1200">
+      <a:lvl2pPr marL="492450" algn="l" defTabSz="984900" rtl="0" eaLnBrk="1" latinLnBrk="0" hangingPunct="1">
+        <a:defRPr sz="1939" kern="1200">
           <a:solidFill>
             <a:schemeClr val="tx1"/>
           </a:solidFill>
@@ -2874,8 +2881,8 @@
           <a:cs typeface="+mn-cs"/>
         </a:defRPr>
       </a:lvl2pPr>
-      <a:lvl3pPr marL="685800" algn="l" defTabSz="685800" rtl="0" eaLnBrk="1" latinLnBrk="0" hangingPunct="1">
-        <a:defRPr sz="1350" kern="1200">
+      <a:lvl3pPr marL="984900" algn="l" defTabSz="984900" rtl="0" eaLnBrk="1" latinLnBrk="0" hangingPunct="1">
+        <a:defRPr sz="1939" kern="1200">
           <a:solidFill>
             <a:schemeClr val="tx1"/>
           </a:solidFill>
@@ -2884,8 +2891,8 @@
           <a:cs typeface="+mn-cs"/>
         </a:defRPr>
       </a:lvl3pPr>
-      <a:lvl4pPr marL="1028700" algn="l" defTabSz="685800" rtl="0" eaLnBrk="1" latinLnBrk="0" hangingPunct="1">
-        <a:defRPr sz="1350" kern="1200">
+      <a:lvl4pPr marL="1477350" algn="l" defTabSz="984900" rtl="0" eaLnBrk="1" latinLnBrk="0" hangingPunct="1">
+        <a:defRPr sz="1939" kern="1200">
           <a:solidFill>
             <a:schemeClr val="tx1"/>
           </a:solidFill>
@@ -2894,8 +2901,8 @@
           <a:cs typeface="+mn-cs"/>
         </a:defRPr>
       </a:lvl4pPr>
-      <a:lvl5pPr marL="1371600" algn="l" defTabSz="685800" rtl="0" eaLnBrk="1" latinLnBrk="0" hangingPunct="1">
-        <a:defRPr sz="1350" kern="1200">
+      <a:lvl5pPr marL="1969800" algn="l" defTabSz="984900" rtl="0" eaLnBrk="1" latinLnBrk="0" hangingPunct="1">
+        <a:defRPr sz="1939" kern="1200">
           <a:solidFill>
             <a:schemeClr val="tx1"/>
           </a:solidFill>
@@ -2904,8 +2911,8 @@
           <a:cs typeface="+mn-cs"/>
         </a:defRPr>
       </a:lvl5pPr>
-      <a:lvl6pPr marL="1714500" algn="l" defTabSz="685800" rtl="0" eaLnBrk="1" latinLnBrk="0" hangingPunct="1">
-        <a:defRPr sz="1350" kern="1200">
+      <a:lvl6pPr marL="2462251" algn="l" defTabSz="984900" rtl="0" eaLnBrk="1" latinLnBrk="0" hangingPunct="1">
+        <a:defRPr sz="1939" kern="1200">
           <a:solidFill>
             <a:schemeClr val="tx1"/>
           </a:solidFill>
@@ -2914,8 +2921,8 @@
           <a:cs typeface="+mn-cs"/>
         </a:defRPr>
       </a:lvl6pPr>
-      <a:lvl7pPr marL="2057400" algn="l" defTabSz="685800" rtl="0" eaLnBrk="1" latinLnBrk="0" hangingPunct="1">
-        <a:defRPr sz="1350" kern="1200">
+      <a:lvl7pPr marL="2954701" algn="l" defTabSz="984900" rtl="0" eaLnBrk="1" latinLnBrk="0" hangingPunct="1">
+        <a:defRPr sz="1939" kern="1200">
           <a:solidFill>
             <a:schemeClr val="tx1"/>
           </a:solidFill>
@@ -2924,8 +2931,8 @@
           <a:cs typeface="+mn-cs"/>
         </a:defRPr>
       </a:lvl7pPr>
-      <a:lvl8pPr marL="2400300" algn="l" defTabSz="685800" rtl="0" eaLnBrk="1" latinLnBrk="0" hangingPunct="1">
-        <a:defRPr sz="1350" kern="1200">
+      <a:lvl8pPr marL="3447151" algn="l" defTabSz="984900" rtl="0" eaLnBrk="1" latinLnBrk="0" hangingPunct="1">
+        <a:defRPr sz="1939" kern="1200">
           <a:solidFill>
             <a:schemeClr val="tx1"/>
           </a:solidFill>
@@ -2934,8 +2941,8 @@
           <a:cs typeface="+mn-cs"/>
         </a:defRPr>
       </a:lvl8pPr>
-      <a:lvl9pPr marL="2743200" algn="l" defTabSz="685800" rtl="0" eaLnBrk="1" latinLnBrk="0" hangingPunct="1">
-        <a:defRPr sz="1350" kern="1200">
+      <a:lvl9pPr marL="3939601" algn="l" defTabSz="984900" rtl="0" eaLnBrk="1" latinLnBrk="0" hangingPunct="1">
+        <a:defRPr sz="1939" kern="1200">
           <a:solidFill>
             <a:schemeClr val="tx1"/>
           </a:solidFill>
@@ -2968,10 +2975,10 @@
       </p:grpSpPr>
       <p:pic>
         <p:nvPicPr>
-          <p:cNvPr id="9" name="Grafik 8">
-            <a:extLst>
-              <a:ext uri="{FF2B5EF4-FFF2-40B4-BE49-F238E27FC236}">
-                <a16:creationId xmlns:a16="http://schemas.microsoft.com/office/drawing/2014/main" id="{B490D08F-084C-4593-BA25-5A679F6F18C8}"/>
+          <p:cNvPr id="5" name="Grafik 4">
+            <a:extLst>
+              <a:ext uri="{FF2B5EF4-FFF2-40B4-BE49-F238E27FC236}">
+                <a16:creationId xmlns:a16="http://schemas.microsoft.com/office/drawing/2014/main" id="{70E4F4D3-D089-48D7-8408-2D68A21FB6E2}"/>
               </a:ext>
             </a:extLst>
           </p:cNvPr>
@@ -2994,8 +3001,8 @@
         </p:blipFill>
         <p:spPr>
           <a:xfrm>
-            <a:off x="0" y="6400800"/>
-            <a:ext cx="5067300" cy="1600200"/>
+            <a:off x="464820" y="1992457"/>
+            <a:ext cx="2556913" cy="807446"/>
           </a:xfrm>
           <a:prstGeom prst="rect">
             <a:avLst/>
@@ -3004,10 +3011,10 @@
       </p:pic>
       <p:pic>
         <p:nvPicPr>
-          <p:cNvPr id="11" name="Grafik 10">
-            <a:extLst>
-              <a:ext uri="{FF2B5EF4-FFF2-40B4-BE49-F238E27FC236}">
-                <a16:creationId xmlns:a16="http://schemas.microsoft.com/office/drawing/2014/main" id="{3AF3CC62-2487-4E5B-BF05-4C863AB9FB9F}"/>
+          <p:cNvPr id="7" name="Grafik 6">
+            <a:extLst>
+              <a:ext uri="{FF2B5EF4-FFF2-40B4-BE49-F238E27FC236}">
+                <a16:creationId xmlns:a16="http://schemas.microsoft.com/office/drawing/2014/main" id="{E66741BD-E20B-48FA-905F-F8B150E27D5D}"/>
               </a:ext>
             </a:extLst>
           </p:cNvPr>
@@ -3030,8 +3037,8 @@
         </p:blipFill>
         <p:spPr>
           <a:xfrm>
-            <a:off x="0" y="8001000"/>
-            <a:ext cx="5067300" cy="1600200"/>
+            <a:off x="464820" y="2798706"/>
+            <a:ext cx="2556913" cy="807446"/>
           </a:xfrm>
           <a:prstGeom prst="rect">
             <a:avLst/>
@@ -3040,10 +3047,10 @@
       </p:pic>
       <p:pic>
         <p:nvPicPr>
-          <p:cNvPr id="13" name="Grafik 12">
-            <a:extLst>
-              <a:ext uri="{FF2B5EF4-FFF2-40B4-BE49-F238E27FC236}">
-                <a16:creationId xmlns:a16="http://schemas.microsoft.com/office/drawing/2014/main" id="{EE7E1D00-8AC3-4384-B9B3-141FFF040C9B}"/>
+          <p:cNvPr id="9" name="Grafik 8">
+            <a:extLst>
+              <a:ext uri="{FF2B5EF4-FFF2-40B4-BE49-F238E27FC236}">
+                <a16:creationId xmlns:a16="http://schemas.microsoft.com/office/drawing/2014/main" id="{B12CB0D1-D5C2-441E-BD0C-47DAC2A42EFC}"/>
               </a:ext>
             </a:extLst>
           </p:cNvPr>
@@ -3066,8 +3073,8 @@
         </p:blipFill>
         <p:spPr>
           <a:xfrm>
-            <a:off x="0" y="0"/>
-            <a:ext cx="5067300" cy="1600200"/>
+            <a:off x="464820" y="3604955"/>
+            <a:ext cx="2556913" cy="807446"/>
           </a:xfrm>
           <a:prstGeom prst="rect">
             <a:avLst/>
@@ -3076,10 +3083,10 @@
       </p:pic>
       <p:pic>
         <p:nvPicPr>
-          <p:cNvPr id="15" name="Grafik 14">
-            <a:extLst>
-              <a:ext uri="{FF2B5EF4-FFF2-40B4-BE49-F238E27FC236}">
-                <a16:creationId xmlns:a16="http://schemas.microsoft.com/office/drawing/2014/main" id="{2C052D6A-E402-49AC-AC18-9978CB215416}"/>
+          <p:cNvPr id="11" name="Grafik 10">
+            <a:extLst>
+              <a:ext uri="{FF2B5EF4-FFF2-40B4-BE49-F238E27FC236}">
+                <a16:creationId xmlns:a16="http://schemas.microsoft.com/office/drawing/2014/main" id="{1940A328-F5A7-462F-A37D-CEF0A36E955F}"/>
               </a:ext>
             </a:extLst>
           </p:cNvPr>
@@ -3102,8 +3109,8 @@
         </p:blipFill>
         <p:spPr>
           <a:xfrm>
-            <a:off x="0" y="1600200"/>
-            <a:ext cx="5067300" cy="1600200"/>
+            <a:off x="464820" y="376667"/>
+            <a:ext cx="2556913" cy="807446"/>
           </a:xfrm>
           <a:prstGeom prst="rect">
             <a:avLst/>
@@ -3112,10 +3119,10 @@
       </p:pic>
       <p:pic>
         <p:nvPicPr>
-          <p:cNvPr id="5" name="Grafik 4">
-            <a:extLst>
-              <a:ext uri="{FF2B5EF4-FFF2-40B4-BE49-F238E27FC236}">
-                <a16:creationId xmlns:a16="http://schemas.microsoft.com/office/drawing/2014/main" id="{98788922-2D12-48F9-B14A-B86C3EBB2335}"/>
+          <p:cNvPr id="13" name="Grafik 12">
+            <a:extLst>
+              <a:ext uri="{FF2B5EF4-FFF2-40B4-BE49-F238E27FC236}">
+                <a16:creationId xmlns:a16="http://schemas.microsoft.com/office/drawing/2014/main" id="{89B67567-8618-4E79-A1D3-01F4055F2BF2}"/>
               </a:ext>
             </a:extLst>
           </p:cNvPr>
@@ -3138,8 +3145,8 @@
         </p:blipFill>
         <p:spPr>
           <a:xfrm>
-            <a:off x="0" y="3200400"/>
-            <a:ext cx="5067300" cy="1600200"/>
+            <a:off x="464820" y="1185010"/>
+            <a:ext cx="2556913" cy="807446"/>
           </a:xfrm>
           <a:prstGeom prst="rect">
             <a:avLst/>
@@ -3148,10 +3155,10 @@
       </p:pic>
       <p:pic>
         <p:nvPicPr>
-          <p:cNvPr id="7" name="Grafik 6">
-            <a:extLst>
-              <a:ext uri="{FF2B5EF4-FFF2-40B4-BE49-F238E27FC236}">
-                <a16:creationId xmlns:a16="http://schemas.microsoft.com/office/drawing/2014/main" id="{1E6E849F-D15E-40CB-9026-A5749EB35158}"/>
+          <p:cNvPr id="15" name="Grafik 14">
+            <a:extLst>
+              <a:ext uri="{FF2B5EF4-FFF2-40B4-BE49-F238E27FC236}">
+                <a16:creationId xmlns:a16="http://schemas.microsoft.com/office/drawing/2014/main" id="{F4FE3B0C-1748-46C7-9AB2-9C49261BA95F}"/>
               </a:ext>
             </a:extLst>
           </p:cNvPr>
@@ -3174,18 +3181,2249 @@
         </p:blipFill>
         <p:spPr>
           <a:xfrm>
-            <a:off x="0" y="4800600"/>
-            <a:ext cx="5067300" cy="1600200"/>
+            <a:off x="3027415" y="1190391"/>
+            <a:ext cx="2556913" cy="807446"/>
           </a:xfrm>
           <a:prstGeom prst="rect">
             <a:avLst/>
           </a:prstGeom>
         </p:spPr>
       </p:pic>
+      <p:pic>
+        <p:nvPicPr>
+          <p:cNvPr id="17" name="Grafik 16">
+            <a:extLst>
+              <a:ext uri="{FF2B5EF4-FFF2-40B4-BE49-F238E27FC236}">
+                <a16:creationId xmlns:a16="http://schemas.microsoft.com/office/drawing/2014/main" id="{930E3DC2-329C-4217-89E4-2C3D4EB080C7}"/>
+              </a:ext>
+            </a:extLst>
+          </p:cNvPr>
+          <p:cNvPicPr>
+            <a:picLocks noChangeAspect="1"/>
+          </p:cNvPicPr>
+          <p:nvPr/>
+        </p:nvPicPr>
+        <p:blipFill>
+          <a:blip r:embed="rId8">
+            <a:extLst>
+              <a:ext uri="{28A0092B-C50C-407E-A947-70E740481C1C}">
+                <a14:useLocalDpi xmlns:a14="http://schemas.microsoft.com/office/drawing/2010/main" val="0"/>
+              </a:ext>
+            </a:extLst>
+          </a:blip>
+          <a:stretch>
+            <a:fillRect/>
+          </a:stretch>
+        </p:blipFill>
+        <p:spPr>
+          <a:xfrm>
+            <a:off x="3016052" y="1992457"/>
+            <a:ext cx="2556913" cy="807446"/>
+          </a:xfrm>
+          <a:prstGeom prst="rect">
+            <a:avLst/>
+          </a:prstGeom>
+        </p:spPr>
+      </p:pic>
+      <p:pic>
+        <p:nvPicPr>
+          <p:cNvPr id="19" name="Grafik 18">
+            <a:extLst>
+              <a:ext uri="{FF2B5EF4-FFF2-40B4-BE49-F238E27FC236}">
+                <a16:creationId xmlns:a16="http://schemas.microsoft.com/office/drawing/2014/main" id="{CE01E29C-5597-43F1-8AC6-45D8B28C574B}"/>
+              </a:ext>
+            </a:extLst>
+          </p:cNvPr>
+          <p:cNvPicPr>
+            <a:picLocks noChangeAspect="1"/>
+          </p:cNvPicPr>
+          <p:nvPr/>
+        </p:nvPicPr>
+        <p:blipFill>
+          <a:blip r:embed="rId9">
+            <a:extLst>
+              <a:ext uri="{28A0092B-C50C-407E-A947-70E740481C1C}">
+                <a14:useLocalDpi xmlns:a14="http://schemas.microsoft.com/office/drawing/2010/main" val="0"/>
+              </a:ext>
+            </a:extLst>
+          </a:blip>
+          <a:stretch>
+            <a:fillRect/>
+          </a:stretch>
+        </p:blipFill>
+        <p:spPr>
+          <a:xfrm>
+            <a:off x="3027415" y="2797509"/>
+            <a:ext cx="2556913" cy="807446"/>
+          </a:xfrm>
+          <a:prstGeom prst="rect">
+            <a:avLst/>
+          </a:prstGeom>
+        </p:spPr>
+      </p:pic>
+      <p:pic>
+        <p:nvPicPr>
+          <p:cNvPr id="21" name="Grafik 20">
+            <a:extLst>
+              <a:ext uri="{FF2B5EF4-FFF2-40B4-BE49-F238E27FC236}">
+                <a16:creationId xmlns:a16="http://schemas.microsoft.com/office/drawing/2014/main" id="{6DE346F8-F8E1-4673-B68C-8D8DE9ED8152}"/>
+              </a:ext>
+            </a:extLst>
+          </p:cNvPr>
+          <p:cNvPicPr>
+            <a:picLocks noChangeAspect="1"/>
+          </p:cNvPicPr>
+          <p:nvPr/>
+        </p:nvPicPr>
+        <p:blipFill>
+          <a:blip r:embed="rId10">
+            <a:extLst>
+              <a:ext uri="{28A0092B-C50C-407E-A947-70E740481C1C}">
+                <a14:useLocalDpi xmlns:a14="http://schemas.microsoft.com/office/drawing/2010/main" val="0"/>
+              </a:ext>
+            </a:extLst>
+          </a:blip>
+          <a:stretch>
+            <a:fillRect/>
+          </a:stretch>
+        </p:blipFill>
+        <p:spPr>
+          <a:xfrm>
+            <a:off x="3021733" y="3610336"/>
+            <a:ext cx="2556913" cy="807446"/>
+          </a:xfrm>
+          <a:prstGeom prst="rect">
+            <a:avLst/>
+          </a:prstGeom>
+        </p:spPr>
+      </p:pic>
+      <p:pic>
+        <p:nvPicPr>
+          <p:cNvPr id="23" name="Grafik 22">
+            <a:extLst>
+              <a:ext uri="{FF2B5EF4-FFF2-40B4-BE49-F238E27FC236}">
+                <a16:creationId xmlns:a16="http://schemas.microsoft.com/office/drawing/2014/main" id="{3A2FC535-A357-4417-A5C8-3D2B802AF15C}"/>
+              </a:ext>
+            </a:extLst>
+          </p:cNvPr>
+          <p:cNvPicPr>
+            <a:picLocks noChangeAspect="1"/>
+          </p:cNvPicPr>
+          <p:nvPr/>
+        </p:nvPicPr>
+        <p:blipFill>
+          <a:blip r:embed="rId11">
+            <a:extLst>
+              <a:ext uri="{28A0092B-C50C-407E-A947-70E740481C1C}">
+                <a14:useLocalDpi xmlns:a14="http://schemas.microsoft.com/office/drawing/2010/main" val="0"/>
+              </a:ext>
+            </a:extLst>
+          </a:blip>
+          <a:stretch>
+            <a:fillRect/>
+          </a:stretch>
+        </p:blipFill>
+        <p:spPr>
+          <a:xfrm>
+            <a:off x="3027415" y="378760"/>
+            <a:ext cx="2556913" cy="807446"/>
+          </a:xfrm>
+          <a:prstGeom prst="rect">
+            <a:avLst/>
+          </a:prstGeom>
+        </p:spPr>
+      </p:pic>
+      <p:pic>
+        <p:nvPicPr>
+          <p:cNvPr id="25" name="Grafik 24">
+            <a:extLst>
+              <a:ext uri="{FF2B5EF4-FFF2-40B4-BE49-F238E27FC236}">
+                <a16:creationId xmlns:a16="http://schemas.microsoft.com/office/drawing/2014/main" id="{9A527341-3409-4CFB-AB47-A6655E845FC7}"/>
+              </a:ext>
+            </a:extLst>
+          </p:cNvPr>
+          <p:cNvPicPr>
+            <a:picLocks noChangeAspect="1"/>
+          </p:cNvPicPr>
+          <p:nvPr/>
+        </p:nvPicPr>
+        <p:blipFill>
+          <a:blip r:embed="rId12">
+            <a:extLst>
+              <a:ext uri="{28A0092B-C50C-407E-A947-70E740481C1C}">
+                <a14:useLocalDpi xmlns:a14="http://schemas.microsoft.com/office/drawing/2010/main" val="0"/>
+              </a:ext>
+            </a:extLst>
+          </a:blip>
+          <a:stretch>
+            <a:fillRect/>
+          </a:stretch>
+        </p:blipFill>
+        <p:spPr>
+          <a:xfrm>
+            <a:off x="5590010" y="1997837"/>
+            <a:ext cx="2556913" cy="807446"/>
+          </a:xfrm>
+          <a:prstGeom prst="rect">
+            <a:avLst/>
+          </a:prstGeom>
+        </p:spPr>
+      </p:pic>
+      <p:pic>
+        <p:nvPicPr>
+          <p:cNvPr id="27" name="Grafik 26">
+            <a:extLst>
+              <a:ext uri="{FF2B5EF4-FFF2-40B4-BE49-F238E27FC236}">
+                <a16:creationId xmlns:a16="http://schemas.microsoft.com/office/drawing/2014/main" id="{BF3D781E-67E4-4D74-B852-1979C7E43F20}"/>
+              </a:ext>
+            </a:extLst>
+          </p:cNvPr>
+          <p:cNvPicPr>
+            <a:picLocks noChangeAspect="1"/>
+          </p:cNvPicPr>
+          <p:nvPr/>
+        </p:nvPicPr>
+        <p:blipFill>
+          <a:blip r:embed="rId13">
+            <a:extLst>
+              <a:ext uri="{28A0092B-C50C-407E-A947-70E740481C1C}">
+                <a14:useLocalDpi xmlns:a14="http://schemas.microsoft.com/office/drawing/2010/main" val="0"/>
+              </a:ext>
+            </a:extLst>
+          </a:blip>
+          <a:stretch>
+            <a:fillRect/>
+          </a:stretch>
+        </p:blipFill>
+        <p:spPr>
+          <a:xfrm>
+            <a:off x="5590010" y="2797509"/>
+            <a:ext cx="2556913" cy="807446"/>
+          </a:xfrm>
+          <a:prstGeom prst="rect">
+            <a:avLst/>
+          </a:prstGeom>
+        </p:spPr>
+      </p:pic>
+      <p:pic>
+        <p:nvPicPr>
+          <p:cNvPr id="29" name="Grafik 28">
+            <a:extLst>
+              <a:ext uri="{FF2B5EF4-FFF2-40B4-BE49-F238E27FC236}">
+                <a16:creationId xmlns:a16="http://schemas.microsoft.com/office/drawing/2014/main" id="{F551123D-F1E1-47B4-935B-7DC42E3C3B36}"/>
+              </a:ext>
+            </a:extLst>
+          </p:cNvPr>
+          <p:cNvPicPr>
+            <a:picLocks noChangeAspect="1"/>
+          </p:cNvPicPr>
+          <p:nvPr/>
+        </p:nvPicPr>
+        <p:blipFill>
+          <a:blip r:embed="rId14">
+            <a:extLst>
+              <a:ext uri="{28A0092B-C50C-407E-A947-70E740481C1C}">
+                <a14:useLocalDpi xmlns:a14="http://schemas.microsoft.com/office/drawing/2010/main" val="0"/>
+              </a:ext>
+            </a:extLst>
+          </a:blip>
+          <a:stretch>
+            <a:fillRect/>
+          </a:stretch>
+        </p:blipFill>
+        <p:spPr>
+          <a:xfrm>
+            <a:off x="5572965" y="3597182"/>
+            <a:ext cx="2556913" cy="807446"/>
+          </a:xfrm>
+          <a:prstGeom prst="rect">
+            <a:avLst/>
+          </a:prstGeom>
+        </p:spPr>
+      </p:pic>
+      <p:pic>
+        <p:nvPicPr>
+          <p:cNvPr id="31" name="Grafik 30">
+            <a:extLst>
+              <a:ext uri="{FF2B5EF4-FFF2-40B4-BE49-F238E27FC236}">
+                <a16:creationId xmlns:a16="http://schemas.microsoft.com/office/drawing/2014/main" id="{8C1104AF-8EC5-4512-99B0-2057E95AC196}"/>
+              </a:ext>
+            </a:extLst>
+          </p:cNvPr>
+          <p:cNvPicPr>
+            <a:picLocks noChangeAspect="1"/>
+          </p:cNvPicPr>
+          <p:nvPr/>
+        </p:nvPicPr>
+        <p:blipFill>
+          <a:blip r:embed="rId15">
+            <a:extLst>
+              <a:ext uri="{28A0092B-C50C-407E-A947-70E740481C1C}">
+                <a14:useLocalDpi xmlns:a14="http://schemas.microsoft.com/office/drawing/2010/main" val="0"/>
+              </a:ext>
+            </a:extLst>
+          </a:blip>
+          <a:stretch>
+            <a:fillRect/>
+          </a:stretch>
+        </p:blipFill>
+        <p:spPr>
+          <a:xfrm>
+            <a:off x="5572965" y="373380"/>
+            <a:ext cx="2556913" cy="807446"/>
+          </a:xfrm>
+          <a:prstGeom prst="rect">
+            <a:avLst/>
+          </a:prstGeom>
+        </p:spPr>
+      </p:pic>
+      <p:pic>
+        <p:nvPicPr>
+          <p:cNvPr id="33" name="Grafik 32">
+            <a:extLst>
+              <a:ext uri="{FF2B5EF4-FFF2-40B4-BE49-F238E27FC236}">
+                <a16:creationId xmlns:a16="http://schemas.microsoft.com/office/drawing/2014/main" id="{5CB7D692-925F-4254-AA2D-18D78F4276D6}"/>
+              </a:ext>
+            </a:extLst>
+          </p:cNvPr>
+          <p:cNvPicPr>
+            <a:picLocks noChangeAspect="1"/>
+          </p:cNvPicPr>
+          <p:nvPr/>
+        </p:nvPicPr>
+        <p:blipFill>
+          <a:blip r:embed="rId16">
+            <a:extLst>
+              <a:ext uri="{28A0092B-C50C-407E-A947-70E740481C1C}">
+                <a14:useLocalDpi xmlns:a14="http://schemas.microsoft.com/office/drawing/2010/main" val="0"/>
+              </a:ext>
+            </a:extLst>
+          </a:blip>
+          <a:stretch>
+            <a:fillRect/>
+          </a:stretch>
+        </p:blipFill>
+        <p:spPr>
+          <a:xfrm>
+            <a:off x="5590010" y="1190391"/>
+            <a:ext cx="2556913" cy="807446"/>
+          </a:xfrm>
+          <a:prstGeom prst="rect">
+            <a:avLst/>
+          </a:prstGeom>
+        </p:spPr>
+      </p:pic>
+      <p:pic>
+        <p:nvPicPr>
+          <p:cNvPr id="35" name="Grafik 34">
+            <a:extLst>
+              <a:ext uri="{FF2B5EF4-FFF2-40B4-BE49-F238E27FC236}">
+                <a16:creationId xmlns:a16="http://schemas.microsoft.com/office/drawing/2014/main" id="{B6CDA8A3-6EEC-42AF-809E-0A71D25D15A1}"/>
+              </a:ext>
+            </a:extLst>
+          </p:cNvPr>
+          <p:cNvPicPr>
+            <a:picLocks noChangeAspect="1"/>
+          </p:cNvPicPr>
+          <p:nvPr/>
+        </p:nvPicPr>
+        <p:blipFill>
+          <a:blip r:embed="rId17">
+            <a:extLst>
+              <a:ext uri="{28A0092B-C50C-407E-A947-70E740481C1C}">
+                <a14:useLocalDpi xmlns:a14="http://schemas.microsoft.com/office/drawing/2010/main" val="0"/>
+              </a:ext>
+            </a:extLst>
+          </a:blip>
+          <a:stretch>
+            <a:fillRect/>
+          </a:stretch>
+        </p:blipFill>
+        <p:spPr>
+          <a:xfrm>
+            <a:off x="8142898" y="2797509"/>
+            <a:ext cx="2556913" cy="807446"/>
+          </a:xfrm>
+          <a:prstGeom prst="rect">
+            <a:avLst/>
+          </a:prstGeom>
+        </p:spPr>
+      </p:pic>
+      <p:pic>
+        <p:nvPicPr>
+          <p:cNvPr id="37" name="Grafik 36">
+            <a:extLst>
+              <a:ext uri="{FF2B5EF4-FFF2-40B4-BE49-F238E27FC236}">
+                <a16:creationId xmlns:a16="http://schemas.microsoft.com/office/drawing/2014/main" id="{D8CDFEEB-09D5-453D-A85F-D81C6B3C7EF4}"/>
+              </a:ext>
+            </a:extLst>
+          </p:cNvPr>
+          <p:cNvPicPr>
+            <a:picLocks noChangeAspect="1"/>
+          </p:cNvPicPr>
+          <p:nvPr/>
+        </p:nvPicPr>
+        <p:blipFill>
+          <a:blip r:embed="rId18">
+            <a:extLst>
+              <a:ext uri="{28A0092B-C50C-407E-A947-70E740481C1C}">
+                <a14:useLocalDpi xmlns:a14="http://schemas.microsoft.com/office/drawing/2010/main" val="0"/>
+              </a:ext>
+            </a:extLst>
+          </a:blip>
+          <a:stretch>
+            <a:fillRect/>
+          </a:stretch>
+        </p:blipFill>
+        <p:spPr>
+          <a:xfrm>
+            <a:off x="8142898" y="3610336"/>
+            <a:ext cx="2556913" cy="807446"/>
+          </a:xfrm>
+          <a:prstGeom prst="rect">
+            <a:avLst/>
+          </a:prstGeom>
+        </p:spPr>
+      </p:pic>
+      <p:pic>
+        <p:nvPicPr>
+          <p:cNvPr id="39" name="Grafik 38">
+            <a:extLst>
+              <a:ext uri="{FF2B5EF4-FFF2-40B4-BE49-F238E27FC236}">
+                <a16:creationId xmlns:a16="http://schemas.microsoft.com/office/drawing/2014/main" id="{B8BDF302-BED3-42F8-8617-1C1B82D4FC69}"/>
+              </a:ext>
+            </a:extLst>
+          </p:cNvPr>
+          <p:cNvPicPr>
+            <a:picLocks noChangeAspect="1"/>
+          </p:cNvPicPr>
+          <p:nvPr/>
+        </p:nvPicPr>
+        <p:blipFill>
+          <a:blip r:embed="rId19">
+            <a:extLst>
+              <a:ext uri="{28A0092B-C50C-407E-A947-70E740481C1C}">
+                <a14:useLocalDpi xmlns:a14="http://schemas.microsoft.com/office/drawing/2010/main" val="0"/>
+              </a:ext>
+            </a:extLst>
+          </a:blip>
+          <a:stretch>
+            <a:fillRect/>
+          </a:stretch>
+        </p:blipFill>
+        <p:spPr>
+          <a:xfrm>
+            <a:off x="8137215" y="1180826"/>
+            <a:ext cx="2556913" cy="807446"/>
+          </a:xfrm>
+          <a:prstGeom prst="rect">
+            <a:avLst/>
+          </a:prstGeom>
+        </p:spPr>
+      </p:pic>
+      <p:pic>
+        <p:nvPicPr>
+          <p:cNvPr id="41" name="Grafik 40">
+            <a:extLst>
+              <a:ext uri="{FF2B5EF4-FFF2-40B4-BE49-F238E27FC236}">
+                <a16:creationId xmlns:a16="http://schemas.microsoft.com/office/drawing/2014/main" id="{02C545C2-0C51-4202-B841-2DC756C0A5C3}"/>
+              </a:ext>
+            </a:extLst>
+          </p:cNvPr>
+          <p:cNvPicPr>
+            <a:picLocks noChangeAspect="1"/>
+          </p:cNvPicPr>
+          <p:nvPr/>
+        </p:nvPicPr>
+        <p:blipFill>
+          <a:blip r:embed="rId20">
+            <a:extLst>
+              <a:ext uri="{28A0092B-C50C-407E-A947-70E740481C1C}">
+                <a14:useLocalDpi xmlns:a14="http://schemas.microsoft.com/office/drawing/2010/main" val="0"/>
+              </a:ext>
+            </a:extLst>
+          </a:blip>
+          <a:stretch>
+            <a:fillRect/>
+          </a:stretch>
+        </p:blipFill>
+        <p:spPr>
+          <a:xfrm>
+            <a:off x="8129878" y="1985281"/>
+            <a:ext cx="2556913" cy="807446"/>
+          </a:xfrm>
+          <a:prstGeom prst="rect">
+            <a:avLst/>
+          </a:prstGeom>
+        </p:spPr>
+      </p:pic>
+      <p:pic>
+        <p:nvPicPr>
+          <p:cNvPr id="43" name="Grafik 42">
+            <a:extLst>
+              <a:ext uri="{FF2B5EF4-FFF2-40B4-BE49-F238E27FC236}">
+                <a16:creationId xmlns:a16="http://schemas.microsoft.com/office/drawing/2014/main" id="{403738CF-5B81-442B-B124-227C66FA31B6}"/>
+              </a:ext>
+            </a:extLst>
+          </p:cNvPr>
+          <p:cNvPicPr>
+            <a:picLocks noChangeAspect="1"/>
+          </p:cNvPicPr>
+          <p:nvPr/>
+        </p:nvPicPr>
+        <p:blipFill>
+          <a:blip r:embed="rId21">
+            <a:extLst>
+              <a:ext uri="{28A0092B-C50C-407E-A947-70E740481C1C}">
+                <a14:useLocalDpi xmlns:a14="http://schemas.microsoft.com/office/drawing/2010/main" val="0"/>
+              </a:ext>
+            </a:extLst>
+          </a:blip>
+          <a:stretch>
+            <a:fillRect/>
+          </a:stretch>
+        </p:blipFill>
+        <p:spPr>
+          <a:xfrm>
+            <a:off x="10691661" y="1985281"/>
+            <a:ext cx="2556913" cy="807446"/>
+          </a:xfrm>
+          <a:prstGeom prst="rect">
+            <a:avLst/>
+          </a:prstGeom>
+        </p:spPr>
+      </p:pic>
+      <p:pic>
+        <p:nvPicPr>
+          <p:cNvPr id="45" name="Grafik 44">
+            <a:extLst>
+              <a:ext uri="{FF2B5EF4-FFF2-40B4-BE49-F238E27FC236}">
+                <a16:creationId xmlns:a16="http://schemas.microsoft.com/office/drawing/2014/main" id="{3BD474D1-86CD-4E58-B44E-1D12DE0174CF}"/>
+              </a:ext>
+            </a:extLst>
+          </p:cNvPr>
+          <p:cNvPicPr>
+            <a:picLocks noChangeAspect="1"/>
+          </p:cNvPicPr>
+          <p:nvPr/>
+        </p:nvPicPr>
+        <p:blipFill>
+          <a:blip r:embed="rId22">
+            <a:extLst>
+              <a:ext uri="{28A0092B-C50C-407E-A947-70E740481C1C}">
+                <a14:useLocalDpi xmlns:a14="http://schemas.microsoft.com/office/drawing/2010/main" val="0"/>
+              </a:ext>
+            </a:extLst>
+          </a:blip>
+          <a:stretch>
+            <a:fillRect/>
+          </a:stretch>
+        </p:blipFill>
+        <p:spPr>
+          <a:xfrm>
+            <a:off x="10675427" y="2807074"/>
+            <a:ext cx="2556913" cy="807446"/>
+          </a:xfrm>
+          <a:prstGeom prst="rect">
+            <a:avLst/>
+          </a:prstGeom>
+        </p:spPr>
+      </p:pic>
+      <p:pic>
+        <p:nvPicPr>
+          <p:cNvPr id="47" name="Grafik 46">
+            <a:extLst>
+              <a:ext uri="{FF2B5EF4-FFF2-40B4-BE49-F238E27FC236}">
+                <a16:creationId xmlns:a16="http://schemas.microsoft.com/office/drawing/2014/main" id="{DBA5A15B-C99D-4232-9F76-2EBBAE0A599D}"/>
+              </a:ext>
+            </a:extLst>
+          </p:cNvPr>
+          <p:cNvPicPr>
+            <a:picLocks noChangeAspect="1"/>
+          </p:cNvPicPr>
+          <p:nvPr/>
+        </p:nvPicPr>
+        <p:blipFill>
+          <a:blip r:embed="rId23">
+            <a:extLst>
+              <a:ext uri="{28A0092B-C50C-407E-A947-70E740481C1C}">
+                <a14:useLocalDpi xmlns:a14="http://schemas.microsoft.com/office/drawing/2010/main" val="0"/>
+              </a:ext>
+            </a:extLst>
+          </a:blip>
+          <a:stretch>
+            <a:fillRect/>
+          </a:stretch>
+        </p:blipFill>
+        <p:spPr>
+          <a:xfrm>
+            <a:off x="10691661" y="3597182"/>
+            <a:ext cx="2556913" cy="807446"/>
+          </a:xfrm>
+          <a:prstGeom prst="rect">
+            <a:avLst/>
+          </a:prstGeom>
+        </p:spPr>
+      </p:pic>
+      <p:pic>
+        <p:nvPicPr>
+          <p:cNvPr id="49" name="Grafik 48">
+            <a:extLst>
+              <a:ext uri="{FF2B5EF4-FFF2-40B4-BE49-F238E27FC236}">
+                <a16:creationId xmlns:a16="http://schemas.microsoft.com/office/drawing/2014/main" id="{ACFA3BD5-092F-4AEF-9A4E-14D5FCEA0104}"/>
+              </a:ext>
+            </a:extLst>
+          </p:cNvPr>
+          <p:cNvPicPr>
+            <a:picLocks noChangeAspect="1"/>
+          </p:cNvPicPr>
+          <p:nvPr/>
+        </p:nvPicPr>
+        <p:blipFill>
+          <a:blip r:embed="rId24">
+            <a:extLst>
+              <a:ext uri="{28A0092B-C50C-407E-A947-70E740481C1C}">
+                <a14:useLocalDpi xmlns:a14="http://schemas.microsoft.com/office/drawing/2010/main" val="0"/>
+              </a:ext>
+            </a:extLst>
+          </a:blip>
+          <a:stretch>
+            <a:fillRect/>
+          </a:stretch>
+        </p:blipFill>
+        <p:spPr>
+          <a:xfrm>
+            <a:off x="10694128" y="1190391"/>
+            <a:ext cx="2556913" cy="807446"/>
+          </a:xfrm>
+          <a:prstGeom prst="rect">
+            <a:avLst/>
+          </a:prstGeom>
+        </p:spPr>
+      </p:pic>
+      <p:pic>
+        <p:nvPicPr>
+          <p:cNvPr id="51" name="Grafik 50">
+            <a:extLst>
+              <a:ext uri="{FF2B5EF4-FFF2-40B4-BE49-F238E27FC236}">
+                <a16:creationId xmlns:a16="http://schemas.microsoft.com/office/drawing/2014/main" id="{7FC7A107-B0BD-485C-96EF-6F30D6CE59EC}"/>
+              </a:ext>
+            </a:extLst>
+          </p:cNvPr>
+          <p:cNvPicPr>
+            <a:picLocks noChangeAspect="1"/>
+          </p:cNvPicPr>
+          <p:nvPr/>
+        </p:nvPicPr>
+        <p:blipFill>
+          <a:blip r:embed="rId25">
+            <a:extLst>
+              <a:ext uri="{28A0092B-C50C-407E-A947-70E740481C1C}">
+                <a14:useLocalDpi xmlns:a14="http://schemas.microsoft.com/office/drawing/2010/main" val="0"/>
+              </a:ext>
+            </a:extLst>
+          </a:blip>
+          <a:stretch>
+            <a:fillRect/>
+          </a:stretch>
+        </p:blipFill>
+        <p:spPr>
+          <a:xfrm>
+            <a:off x="13226659" y="1980499"/>
+            <a:ext cx="2556913" cy="807446"/>
+          </a:xfrm>
+          <a:prstGeom prst="rect">
+            <a:avLst/>
+          </a:prstGeom>
+        </p:spPr>
+      </p:pic>
+      <p:pic>
+        <p:nvPicPr>
+          <p:cNvPr id="53" name="Grafik 52">
+            <a:extLst>
+              <a:ext uri="{FF2B5EF4-FFF2-40B4-BE49-F238E27FC236}">
+                <a16:creationId xmlns:a16="http://schemas.microsoft.com/office/drawing/2014/main" id="{07F3F76F-E680-43E4-AF90-49DEE8F2FD45}"/>
+              </a:ext>
+            </a:extLst>
+          </p:cNvPr>
+          <p:cNvPicPr>
+            <a:picLocks noChangeAspect="1"/>
+          </p:cNvPicPr>
+          <p:nvPr/>
+        </p:nvPicPr>
+        <p:blipFill>
+          <a:blip r:embed="rId26">
+            <a:extLst>
+              <a:ext uri="{28A0092B-C50C-407E-A947-70E740481C1C}">
+                <a14:useLocalDpi xmlns:a14="http://schemas.microsoft.com/office/drawing/2010/main" val="0"/>
+              </a:ext>
+            </a:extLst>
+          </a:blip>
+          <a:stretch>
+            <a:fillRect/>
+          </a:stretch>
+        </p:blipFill>
+        <p:spPr>
+          <a:xfrm>
+            <a:off x="13252699" y="2805283"/>
+            <a:ext cx="2556913" cy="807446"/>
+          </a:xfrm>
+          <a:prstGeom prst="rect">
+            <a:avLst/>
+          </a:prstGeom>
+        </p:spPr>
+      </p:pic>
+      <p:pic>
+        <p:nvPicPr>
+          <p:cNvPr id="55" name="Grafik 54">
+            <a:extLst>
+              <a:ext uri="{FF2B5EF4-FFF2-40B4-BE49-F238E27FC236}">
+                <a16:creationId xmlns:a16="http://schemas.microsoft.com/office/drawing/2014/main" id="{2C9A64B5-79CD-4753-8A33-023FC6CF7BBA}"/>
+              </a:ext>
+            </a:extLst>
+          </p:cNvPr>
+          <p:cNvPicPr>
+            <a:picLocks noChangeAspect="1"/>
+          </p:cNvPicPr>
+          <p:nvPr/>
+        </p:nvPicPr>
+        <p:blipFill>
+          <a:blip r:embed="rId27">
+            <a:extLst>
+              <a:ext uri="{28A0092B-C50C-407E-A947-70E740481C1C}">
+                <a14:useLocalDpi xmlns:a14="http://schemas.microsoft.com/office/drawing/2010/main" val="0"/>
+              </a:ext>
+            </a:extLst>
+          </a:blip>
+          <a:stretch>
+            <a:fillRect/>
+          </a:stretch>
+        </p:blipFill>
+        <p:spPr>
+          <a:xfrm>
+            <a:off x="13240424" y="3604955"/>
+            <a:ext cx="2556913" cy="807446"/>
+          </a:xfrm>
+          <a:prstGeom prst="rect">
+            <a:avLst/>
+          </a:prstGeom>
+        </p:spPr>
+      </p:pic>
+      <p:pic>
+        <p:nvPicPr>
+          <p:cNvPr id="57" name="Grafik 56">
+            <a:extLst>
+              <a:ext uri="{FF2B5EF4-FFF2-40B4-BE49-F238E27FC236}">
+                <a16:creationId xmlns:a16="http://schemas.microsoft.com/office/drawing/2014/main" id="{657F7831-812E-4945-B469-37DEDD1074A9}"/>
+              </a:ext>
+            </a:extLst>
+          </p:cNvPr>
+          <p:cNvPicPr>
+            <a:picLocks noChangeAspect="1"/>
+          </p:cNvPicPr>
+          <p:nvPr/>
+        </p:nvPicPr>
+        <p:blipFill>
+          <a:blip r:embed="rId28">
+            <a:extLst>
+              <a:ext uri="{28A0092B-C50C-407E-A947-70E740481C1C}">
+                <a14:useLocalDpi xmlns:a14="http://schemas.microsoft.com/office/drawing/2010/main" val="0"/>
+              </a:ext>
+            </a:extLst>
+          </a:blip>
+          <a:stretch>
+            <a:fillRect/>
+          </a:stretch>
+        </p:blipFill>
+        <p:spPr>
+          <a:xfrm>
+            <a:off x="13248574" y="1190391"/>
+            <a:ext cx="2556913" cy="807446"/>
+          </a:xfrm>
+          <a:prstGeom prst="rect">
+            <a:avLst/>
+          </a:prstGeom>
+        </p:spPr>
+      </p:pic>
+      <p:pic>
+        <p:nvPicPr>
+          <p:cNvPr id="59" name="Grafik 58">
+            <a:extLst>
+              <a:ext uri="{FF2B5EF4-FFF2-40B4-BE49-F238E27FC236}">
+                <a16:creationId xmlns:a16="http://schemas.microsoft.com/office/drawing/2014/main" id="{B2929EE3-8689-42E5-90B4-94BC0C1A2028}"/>
+              </a:ext>
+            </a:extLst>
+          </p:cNvPr>
+          <p:cNvPicPr>
+            <a:picLocks noChangeAspect="1"/>
+          </p:cNvPicPr>
+          <p:nvPr/>
+        </p:nvPicPr>
+        <p:blipFill>
+          <a:blip r:embed="rId29">
+            <a:extLst>
+              <a:ext uri="{28A0092B-C50C-407E-A947-70E740481C1C}">
+                <a14:useLocalDpi xmlns:a14="http://schemas.microsoft.com/office/drawing/2010/main" val="0"/>
+              </a:ext>
+            </a:extLst>
+          </a:blip>
+          <a:stretch>
+            <a:fillRect/>
+          </a:stretch>
+        </p:blipFill>
+        <p:spPr>
+          <a:xfrm>
+            <a:off x="15825126" y="1980499"/>
+            <a:ext cx="2556913" cy="807446"/>
+          </a:xfrm>
+          <a:prstGeom prst="rect">
+            <a:avLst/>
+          </a:prstGeom>
+        </p:spPr>
+      </p:pic>
+      <p:pic>
+        <p:nvPicPr>
+          <p:cNvPr id="61" name="Grafik 60">
+            <a:extLst>
+              <a:ext uri="{FF2B5EF4-FFF2-40B4-BE49-F238E27FC236}">
+                <a16:creationId xmlns:a16="http://schemas.microsoft.com/office/drawing/2014/main" id="{D8B7B450-86E9-4AC5-955B-BEF875280431}"/>
+              </a:ext>
+            </a:extLst>
+          </p:cNvPr>
+          <p:cNvPicPr>
+            <a:picLocks noChangeAspect="1"/>
+          </p:cNvPicPr>
+          <p:nvPr/>
+        </p:nvPicPr>
+        <p:blipFill>
+          <a:blip r:embed="rId30">
+            <a:extLst>
+              <a:ext uri="{28A0092B-C50C-407E-A947-70E740481C1C}">
+                <a14:useLocalDpi xmlns:a14="http://schemas.microsoft.com/office/drawing/2010/main" val="0"/>
+              </a:ext>
+            </a:extLst>
+          </a:blip>
+          <a:stretch>
+            <a:fillRect/>
+          </a:stretch>
+        </p:blipFill>
+        <p:spPr>
+          <a:xfrm>
+            <a:off x="15825126" y="2805283"/>
+            <a:ext cx="2556913" cy="807446"/>
+          </a:xfrm>
+          <a:prstGeom prst="rect">
+            <a:avLst/>
+          </a:prstGeom>
+        </p:spPr>
+      </p:pic>
+      <p:pic>
+        <p:nvPicPr>
+          <p:cNvPr id="63" name="Grafik 62">
+            <a:extLst>
+              <a:ext uri="{FF2B5EF4-FFF2-40B4-BE49-F238E27FC236}">
+                <a16:creationId xmlns:a16="http://schemas.microsoft.com/office/drawing/2014/main" id="{E1A33CED-659C-4868-93E3-3D7DDA26F864}"/>
+              </a:ext>
+            </a:extLst>
+          </p:cNvPr>
+          <p:cNvPicPr>
+            <a:picLocks noChangeAspect="1"/>
+          </p:cNvPicPr>
+          <p:nvPr/>
+        </p:nvPicPr>
+        <p:blipFill>
+          <a:blip r:embed="rId31">
+            <a:extLst>
+              <a:ext uri="{28A0092B-C50C-407E-A947-70E740481C1C}">
+                <a14:useLocalDpi xmlns:a14="http://schemas.microsoft.com/office/drawing/2010/main" val="0"/>
+              </a:ext>
+            </a:extLst>
+          </a:blip>
+          <a:stretch>
+            <a:fillRect/>
+          </a:stretch>
+        </p:blipFill>
+        <p:spPr>
+          <a:xfrm>
+            <a:off x="15825125" y="3604955"/>
+            <a:ext cx="2556913" cy="807446"/>
+          </a:xfrm>
+          <a:prstGeom prst="rect">
+            <a:avLst/>
+          </a:prstGeom>
+        </p:spPr>
+      </p:pic>
+      <p:pic>
+        <p:nvPicPr>
+          <p:cNvPr id="65" name="Grafik 64">
+            <a:extLst>
+              <a:ext uri="{FF2B5EF4-FFF2-40B4-BE49-F238E27FC236}">
+                <a16:creationId xmlns:a16="http://schemas.microsoft.com/office/drawing/2014/main" id="{E6D00772-595D-4D00-940D-3F19A473160C}"/>
+              </a:ext>
+            </a:extLst>
+          </p:cNvPr>
+          <p:cNvPicPr>
+            <a:picLocks noChangeAspect="1"/>
+          </p:cNvPicPr>
+          <p:nvPr/>
+        </p:nvPicPr>
+        <p:blipFill>
+          <a:blip r:embed="rId32">
+            <a:extLst>
+              <a:ext uri="{28A0092B-C50C-407E-A947-70E740481C1C}">
+                <a14:useLocalDpi xmlns:a14="http://schemas.microsoft.com/office/drawing/2010/main" val="0"/>
+              </a:ext>
+            </a:extLst>
+          </a:blip>
+          <a:stretch>
+            <a:fillRect/>
+          </a:stretch>
+        </p:blipFill>
+        <p:spPr>
+          <a:xfrm>
+            <a:off x="15783572" y="381154"/>
+            <a:ext cx="2556913" cy="807446"/>
+          </a:xfrm>
+          <a:prstGeom prst="rect">
+            <a:avLst/>
+          </a:prstGeom>
+        </p:spPr>
+      </p:pic>
+      <p:pic>
+        <p:nvPicPr>
+          <p:cNvPr id="67" name="Grafik 66">
+            <a:extLst>
+              <a:ext uri="{FF2B5EF4-FFF2-40B4-BE49-F238E27FC236}">
+                <a16:creationId xmlns:a16="http://schemas.microsoft.com/office/drawing/2014/main" id="{9EFE3FCA-0C0A-4515-9F82-18B5B9E7167D}"/>
+              </a:ext>
+            </a:extLst>
+          </p:cNvPr>
+          <p:cNvPicPr>
+            <a:picLocks noChangeAspect="1"/>
+          </p:cNvPicPr>
+          <p:nvPr/>
+        </p:nvPicPr>
+        <p:blipFill>
+          <a:blip r:embed="rId33">
+            <a:extLst>
+              <a:ext uri="{28A0092B-C50C-407E-A947-70E740481C1C}">
+                <a14:useLocalDpi xmlns:a14="http://schemas.microsoft.com/office/drawing/2010/main" val="0"/>
+              </a:ext>
+            </a:extLst>
+          </a:blip>
+          <a:stretch>
+            <a:fillRect/>
+          </a:stretch>
+        </p:blipFill>
+        <p:spPr>
+          <a:xfrm>
+            <a:off x="15794530" y="1193721"/>
+            <a:ext cx="2556913" cy="807446"/>
+          </a:xfrm>
+          <a:prstGeom prst="rect">
+            <a:avLst/>
+          </a:prstGeom>
+        </p:spPr>
+      </p:pic>
+      <p:pic>
+        <p:nvPicPr>
+          <p:cNvPr id="69" name="Grafik 68">
+            <a:extLst>
+              <a:ext uri="{FF2B5EF4-FFF2-40B4-BE49-F238E27FC236}">
+                <a16:creationId xmlns:a16="http://schemas.microsoft.com/office/drawing/2014/main" id="{556E1FCB-CEEE-4CB5-BEA5-0159517A0D14}"/>
+              </a:ext>
+            </a:extLst>
+          </p:cNvPr>
+          <p:cNvPicPr>
+            <a:picLocks noChangeAspect="1"/>
+          </p:cNvPicPr>
+          <p:nvPr/>
+        </p:nvPicPr>
+        <p:blipFill>
+          <a:blip r:embed="rId34">
+            <a:extLst>
+              <a:ext uri="{28A0092B-C50C-407E-A947-70E740481C1C}">
+                <a14:useLocalDpi xmlns:a14="http://schemas.microsoft.com/office/drawing/2010/main" val="0"/>
+              </a:ext>
+            </a:extLst>
+          </a:blip>
+          <a:stretch>
+            <a:fillRect/>
+          </a:stretch>
+        </p:blipFill>
+        <p:spPr>
+          <a:xfrm>
+            <a:off x="18362400" y="1999149"/>
+            <a:ext cx="2556914" cy="807446"/>
+          </a:xfrm>
+          <a:prstGeom prst="rect">
+            <a:avLst/>
+          </a:prstGeom>
+        </p:spPr>
+      </p:pic>
+      <p:pic>
+        <p:nvPicPr>
+          <p:cNvPr id="71" name="Grafik 70">
+            <a:extLst>
+              <a:ext uri="{FF2B5EF4-FFF2-40B4-BE49-F238E27FC236}">
+                <a16:creationId xmlns:a16="http://schemas.microsoft.com/office/drawing/2014/main" id="{D69B043D-7E54-4E4A-8499-A12A3A6E4DFF}"/>
+              </a:ext>
+            </a:extLst>
+          </p:cNvPr>
+          <p:cNvPicPr>
+            <a:picLocks noChangeAspect="1"/>
+          </p:cNvPicPr>
+          <p:nvPr/>
+        </p:nvPicPr>
+        <p:blipFill>
+          <a:blip r:embed="rId35">
+            <a:extLst>
+              <a:ext uri="{28A0092B-C50C-407E-A947-70E740481C1C}">
+                <a14:useLocalDpi xmlns:a14="http://schemas.microsoft.com/office/drawing/2010/main" val="0"/>
+              </a:ext>
+            </a:extLst>
+          </a:blip>
+          <a:stretch>
+            <a:fillRect/>
+          </a:stretch>
+        </p:blipFill>
+        <p:spPr>
+          <a:xfrm>
+            <a:off x="18382038" y="2806285"/>
+            <a:ext cx="2556914" cy="807446"/>
+          </a:xfrm>
+          <a:prstGeom prst="rect">
+            <a:avLst/>
+          </a:prstGeom>
+        </p:spPr>
+      </p:pic>
+      <p:pic>
+        <p:nvPicPr>
+          <p:cNvPr id="73" name="Grafik 72">
+            <a:extLst>
+              <a:ext uri="{FF2B5EF4-FFF2-40B4-BE49-F238E27FC236}">
+                <a16:creationId xmlns:a16="http://schemas.microsoft.com/office/drawing/2014/main" id="{088C7CF0-5159-4714-9948-50469BB34F49}"/>
+              </a:ext>
+            </a:extLst>
+          </p:cNvPr>
+          <p:cNvPicPr>
+            <a:picLocks noChangeAspect="1"/>
+          </p:cNvPicPr>
+          <p:nvPr/>
+        </p:nvPicPr>
+        <p:blipFill>
+          <a:blip r:embed="rId36">
+            <a:extLst>
+              <a:ext uri="{28A0092B-C50C-407E-A947-70E740481C1C}">
+                <a14:useLocalDpi xmlns:a14="http://schemas.microsoft.com/office/drawing/2010/main" val="0"/>
+              </a:ext>
+            </a:extLst>
+          </a:blip>
+          <a:stretch>
+            <a:fillRect/>
+          </a:stretch>
+        </p:blipFill>
+        <p:spPr>
+          <a:xfrm>
+            <a:off x="18362400" y="3582608"/>
+            <a:ext cx="2556914" cy="807446"/>
+          </a:xfrm>
+          <a:prstGeom prst="rect">
+            <a:avLst/>
+          </a:prstGeom>
+        </p:spPr>
+      </p:pic>
+      <p:pic>
+        <p:nvPicPr>
+          <p:cNvPr id="75" name="Grafik 74">
+            <a:extLst>
+              <a:ext uri="{FF2B5EF4-FFF2-40B4-BE49-F238E27FC236}">
+                <a16:creationId xmlns:a16="http://schemas.microsoft.com/office/drawing/2014/main" id="{190CB5A5-C956-4630-815C-FBDEDED194E6}"/>
+              </a:ext>
+            </a:extLst>
+          </p:cNvPr>
+          <p:cNvPicPr>
+            <a:picLocks noChangeAspect="1"/>
+          </p:cNvPicPr>
+          <p:nvPr/>
+        </p:nvPicPr>
+        <p:blipFill>
+          <a:blip r:embed="rId37">
+            <a:extLst>
+              <a:ext uri="{28A0092B-C50C-407E-A947-70E740481C1C}">
+                <a14:useLocalDpi xmlns:a14="http://schemas.microsoft.com/office/drawing/2010/main" val="0"/>
+              </a:ext>
+            </a:extLst>
+          </a:blip>
+          <a:stretch>
+            <a:fillRect/>
+          </a:stretch>
+        </p:blipFill>
+        <p:spPr>
+          <a:xfrm>
+            <a:off x="18338017" y="378390"/>
+            <a:ext cx="2556914" cy="807446"/>
+          </a:xfrm>
+          <a:prstGeom prst="rect">
+            <a:avLst/>
+          </a:prstGeom>
+        </p:spPr>
+      </p:pic>
+      <p:pic>
+        <p:nvPicPr>
+          <p:cNvPr id="77" name="Grafik 76">
+            <a:extLst>
+              <a:ext uri="{FF2B5EF4-FFF2-40B4-BE49-F238E27FC236}">
+                <a16:creationId xmlns:a16="http://schemas.microsoft.com/office/drawing/2014/main" id="{2244348E-816A-4588-9DAD-F07B0C23D33C}"/>
+              </a:ext>
+            </a:extLst>
+          </p:cNvPr>
+          <p:cNvPicPr>
+            <a:picLocks noChangeAspect="1"/>
+          </p:cNvPicPr>
+          <p:nvPr/>
+        </p:nvPicPr>
+        <p:blipFill>
+          <a:blip r:embed="rId38">
+            <a:extLst>
+              <a:ext uri="{28A0092B-C50C-407E-A947-70E740481C1C}">
+                <a14:useLocalDpi xmlns:a14="http://schemas.microsoft.com/office/drawing/2010/main" val="0"/>
+              </a:ext>
+            </a:extLst>
+          </a:blip>
+          <a:stretch>
+            <a:fillRect/>
+          </a:stretch>
+        </p:blipFill>
+        <p:spPr>
+          <a:xfrm>
+            <a:off x="18347822" y="1184834"/>
+            <a:ext cx="2556914" cy="807446"/>
+          </a:xfrm>
+          <a:prstGeom prst="rect">
+            <a:avLst/>
+          </a:prstGeom>
+        </p:spPr>
+      </p:pic>
+      <p:pic>
+        <p:nvPicPr>
+          <p:cNvPr id="79" name="Grafik 78">
+            <a:extLst>
+              <a:ext uri="{FF2B5EF4-FFF2-40B4-BE49-F238E27FC236}">
+                <a16:creationId xmlns:a16="http://schemas.microsoft.com/office/drawing/2014/main" id="{168A2FF9-DD8B-4666-BB85-C5F25B89EFDA}"/>
+              </a:ext>
+            </a:extLst>
+          </p:cNvPr>
+          <p:cNvPicPr>
+            <a:picLocks noChangeAspect="1"/>
+          </p:cNvPicPr>
+          <p:nvPr/>
+        </p:nvPicPr>
+        <p:blipFill>
+          <a:blip r:embed="rId39">
+            <a:extLst>
+              <a:ext uri="{28A0092B-C50C-407E-A947-70E740481C1C}">
+                <a14:useLocalDpi xmlns:a14="http://schemas.microsoft.com/office/drawing/2010/main" val="0"/>
+              </a:ext>
+            </a:extLst>
+          </a:blip>
+          <a:stretch>
+            <a:fillRect/>
+          </a:stretch>
+        </p:blipFill>
+        <p:spPr>
+          <a:xfrm>
+            <a:off x="20899674" y="2783938"/>
+            <a:ext cx="2556914" cy="807447"/>
+          </a:xfrm>
+          <a:prstGeom prst="rect">
+            <a:avLst/>
+          </a:prstGeom>
+        </p:spPr>
+      </p:pic>
+      <p:pic>
+        <p:nvPicPr>
+          <p:cNvPr id="81" name="Grafik 80">
+            <a:extLst>
+              <a:ext uri="{FF2B5EF4-FFF2-40B4-BE49-F238E27FC236}">
+                <a16:creationId xmlns:a16="http://schemas.microsoft.com/office/drawing/2014/main" id="{1444C40F-2B59-4ACD-BDB7-9E640EBBE338}"/>
+              </a:ext>
+            </a:extLst>
+          </p:cNvPr>
+          <p:cNvPicPr>
+            <a:picLocks noChangeAspect="1"/>
+          </p:cNvPicPr>
+          <p:nvPr/>
+        </p:nvPicPr>
+        <p:blipFill>
+          <a:blip r:embed="rId40">
+            <a:extLst>
+              <a:ext uri="{28A0092B-C50C-407E-A947-70E740481C1C}">
+                <a14:useLocalDpi xmlns:a14="http://schemas.microsoft.com/office/drawing/2010/main" val="0"/>
+              </a:ext>
+            </a:extLst>
+          </a:blip>
+          <a:stretch>
+            <a:fillRect/>
+          </a:stretch>
+        </p:blipFill>
+        <p:spPr>
+          <a:xfrm>
+            <a:off x="20899674" y="3590072"/>
+            <a:ext cx="2556914" cy="807447"/>
+          </a:xfrm>
+          <a:prstGeom prst="rect">
+            <a:avLst/>
+          </a:prstGeom>
+        </p:spPr>
+      </p:pic>
+      <p:pic>
+        <p:nvPicPr>
+          <p:cNvPr id="83" name="Grafik 82">
+            <a:extLst>
+              <a:ext uri="{FF2B5EF4-FFF2-40B4-BE49-F238E27FC236}">
+                <a16:creationId xmlns:a16="http://schemas.microsoft.com/office/drawing/2014/main" id="{72822176-8B51-4139-8F94-DBF417F8D342}"/>
+              </a:ext>
+            </a:extLst>
+          </p:cNvPr>
+          <p:cNvPicPr>
+            <a:picLocks noChangeAspect="1"/>
+          </p:cNvPicPr>
+          <p:nvPr/>
+        </p:nvPicPr>
+        <p:blipFill>
+          <a:blip r:embed="rId41">
+            <a:extLst>
+              <a:ext uri="{28A0092B-C50C-407E-A947-70E740481C1C}">
+                <a14:useLocalDpi xmlns:a14="http://schemas.microsoft.com/office/drawing/2010/main" val="0"/>
+              </a:ext>
+            </a:extLst>
+          </a:blip>
+          <a:stretch>
+            <a:fillRect/>
+          </a:stretch>
+        </p:blipFill>
+        <p:spPr>
+          <a:xfrm>
+            <a:off x="20892463" y="1174094"/>
+            <a:ext cx="2556914" cy="807447"/>
+          </a:xfrm>
+          <a:prstGeom prst="rect">
+            <a:avLst/>
+          </a:prstGeom>
+        </p:spPr>
+      </p:pic>
+      <p:pic>
+        <p:nvPicPr>
+          <p:cNvPr id="85" name="Grafik 84">
+            <a:extLst>
+              <a:ext uri="{FF2B5EF4-FFF2-40B4-BE49-F238E27FC236}">
+                <a16:creationId xmlns:a16="http://schemas.microsoft.com/office/drawing/2014/main" id="{27C51CF9-B3B9-4F49-B1BA-4219BA313640}"/>
+              </a:ext>
+            </a:extLst>
+          </p:cNvPr>
+          <p:cNvPicPr>
+            <a:picLocks noChangeAspect="1"/>
+          </p:cNvPicPr>
+          <p:nvPr/>
+        </p:nvPicPr>
+        <p:blipFill>
+          <a:blip r:embed="rId42">
+            <a:extLst>
+              <a:ext uri="{28A0092B-C50C-407E-A947-70E740481C1C}">
+                <a14:useLocalDpi xmlns:a14="http://schemas.microsoft.com/office/drawing/2010/main" val="0"/>
+              </a:ext>
+            </a:extLst>
+          </a:blip>
+          <a:stretch>
+            <a:fillRect/>
+          </a:stretch>
+        </p:blipFill>
+        <p:spPr>
+          <a:xfrm>
+            <a:off x="20902268" y="1997836"/>
+            <a:ext cx="2556914" cy="807447"/>
+          </a:xfrm>
+          <a:prstGeom prst="rect">
+            <a:avLst/>
+          </a:prstGeom>
+        </p:spPr>
+      </p:pic>
+      <p:sp>
+        <p:nvSpPr>
+          <p:cNvPr id="86" name="Textfeld 85">
+            <a:extLst>
+              <a:ext uri="{FF2B5EF4-FFF2-40B4-BE49-F238E27FC236}">
+                <a16:creationId xmlns:a16="http://schemas.microsoft.com/office/drawing/2014/main" id="{013A03FB-37FA-4C9E-A67C-B330146C933E}"/>
+              </a:ext>
+            </a:extLst>
+          </p:cNvPr>
+          <p:cNvSpPr txBox="1"/>
+          <p:nvPr/>
+        </p:nvSpPr>
+        <p:spPr>
+          <a:xfrm>
+            <a:off x="4719" y="540824"/>
+            <a:ext cx="481222" cy="3724096"/>
+          </a:xfrm>
+          <a:prstGeom prst="rect">
+            <a:avLst/>
+          </a:prstGeom>
+          <a:noFill/>
+        </p:spPr>
+        <p:txBody>
+          <a:bodyPr wrap="none" rtlCol="0">
+            <a:spAutoFit/>
+          </a:bodyPr>
+          <a:lstStyle/>
+          <a:p>
+            <a:r>
+              <a:rPr lang="de-DE" sz="1400" dirty="0"/>
+              <a:t>N=2</a:t>
+            </a:r>
+          </a:p>
+          <a:p>
+            <a:endParaRPr lang="de-DE" sz="1400" dirty="0"/>
+          </a:p>
+          <a:p>
+            <a:endParaRPr lang="de-DE" sz="1400" dirty="0"/>
+          </a:p>
+          <a:p>
+            <a:endParaRPr lang="de-DE" sz="1400" dirty="0"/>
+          </a:p>
+          <a:p>
+            <a:r>
+              <a:rPr lang="de-DE" sz="1400" dirty="0"/>
+              <a:t>N=3</a:t>
+            </a:r>
+          </a:p>
+          <a:p>
+            <a:endParaRPr lang="de-DE" sz="1400" dirty="0"/>
+          </a:p>
+          <a:p>
+            <a:endParaRPr lang="de-DE" sz="1400" dirty="0"/>
+          </a:p>
+          <a:p>
+            <a:endParaRPr lang="de-DE" sz="1400" dirty="0"/>
+          </a:p>
+          <a:p>
+            <a:r>
+              <a:rPr lang="de-DE" sz="1400" dirty="0"/>
+              <a:t>N=4</a:t>
+            </a:r>
+          </a:p>
+          <a:p>
+            <a:endParaRPr lang="de-DE" sz="1400" dirty="0"/>
+          </a:p>
+          <a:p>
+            <a:endParaRPr lang="de-DE" sz="1200" dirty="0"/>
+          </a:p>
+          <a:p>
+            <a:endParaRPr lang="de-DE" sz="1400" dirty="0"/>
+          </a:p>
+          <a:p>
+            <a:r>
+              <a:rPr lang="de-DE" sz="1400" dirty="0"/>
+              <a:t>N=5</a:t>
+            </a:r>
+          </a:p>
+          <a:p>
+            <a:endParaRPr lang="de-DE" sz="1400" dirty="0"/>
+          </a:p>
+          <a:p>
+            <a:endParaRPr lang="de-DE" sz="1400" dirty="0"/>
+          </a:p>
+          <a:p>
+            <a:endParaRPr lang="de-DE" sz="1400" dirty="0"/>
+          </a:p>
+          <a:p>
+            <a:r>
+              <a:rPr lang="de-DE" sz="1400" dirty="0"/>
+              <a:t>N=6</a:t>
+            </a:r>
+          </a:p>
+        </p:txBody>
+      </p:sp>
+      <p:sp>
+        <p:nvSpPr>
+          <p:cNvPr id="87" name="Textfeld 86">
+            <a:extLst>
+              <a:ext uri="{FF2B5EF4-FFF2-40B4-BE49-F238E27FC236}">
+                <a16:creationId xmlns:a16="http://schemas.microsoft.com/office/drawing/2014/main" id="{20D3B612-C51E-419E-856B-152199819C40}"/>
+              </a:ext>
+            </a:extLst>
+          </p:cNvPr>
+          <p:cNvSpPr txBox="1"/>
+          <p:nvPr/>
+        </p:nvSpPr>
+        <p:spPr>
+          <a:xfrm>
+            <a:off x="1280160" y="0"/>
+            <a:ext cx="364202" cy="307777"/>
+          </a:xfrm>
+          <a:prstGeom prst="rect">
+            <a:avLst/>
+          </a:prstGeom>
+          <a:noFill/>
+        </p:spPr>
+        <p:txBody>
+          <a:bodyPr wrap="none" rtlCol="0">
+            <a:spAutoFit/>
+          </a:bodyPr>
+          <a:lstStyle/>
+          <a:p>
+            <a:r>
+              <a:rPr lang="de-DE" sz="1400" dirty="0"/>
+              <a:t>E1</a:t>
+            </a:r>
+          </a:p>
+        </p:txBody>
+      </p:sp>
+      <p:sp>
+        <p:nvSpPr>
+          <p:cNvPr id="88" name="Textfeld 87">
+            <a:extLst>
+              <a:ext uri="{FF2B5EF4-FFF2-40B4-BE49-F238E27FC236}">
+                <a16:creationId xmlns:a16="http://schemas.microsoft.com/office/drawing/2014/main" id="{36AE6EA1-4D08-46F5-9E92-412654F25595}"/>
+              </a:ext>
+            </a:extLst>
+          </p:cNvPr>
+          <p:cNvSpPr txBox="1"/>
+          <p:nvPr/>
+        </p:nvSpPr>
+        <p:spPr>
+          <a:xfrm>
+            <a:off x="3947585" y="-1"/>
+            <a:ext cx="364202" cy="307777"/>
+          </a:xfrm>
+          <a:prstGeom prst="rect">
+            <a:avLst/>
+          </a:prstGeom>
+          <a:noFill/>
+        </p:spPr>
+        <p:txBody>
+          <a:bodyPr wrap="none" rtlCol="0">
+            <a:spAutoFit/>
+          </a:bodyPr>
+          <a:lstStyle/>
+          <a:p>
+            <a:r>
+              <a:rPr lang="de-DE" sz="1400" dirty="0"/>
+              <a:t>E2</a:t>
+            </a:r>
+          </a:p>
+        </p:txBody>
+      </p:sp>
+      <p:sp>
+        <p:nvSpPr>
+          <p:cNvPr id="89" name="Textfeld 88">
+            <a:extLst>
+              <a:ext uri="{FF2B5EF4-FFF2-40B4-BE49-F238E27FC236}">
+                <a16:creationId xmlns:a16="http://schemas.microsoft.com/office/drawing/2014/main" id="{3F2F2ACD-FB4C-4BE1-953F-CE464BE7CBB5}"/>
+              </a:ext>
+            </a:extLst>
+          </p:cNvPr>
+          <p:cNvSpPr txBox="1"/>
+          <p:nvPr/>
+        </p:nvSpPr>
+        <p:spPr>
+          <a:xfrm>
+            <a:off x="6481662" y="-2"/>
+            <a:ext cx="364202" cy="307777"/>
+          </a:xfrm>
+          <a:prstGeom prst="rect">
+            <a:avLst/>
+          </a:prstGeom>
+          <a:noFill/>
+        </p:spPr>
+        <p:txBody>
+          <a:bodyPr wrap="none" rtlCol="0">
+            <a:spAutoFit/>
+          </a:bodyPr>
+          <a:lstStyle/>
+          <a:p>
+            <a:r>
+              <a:rPr lang="de-DE" sz="1400" dirty="0"/>
+              <a:t>E3</a:t>
+            </a:r>
+          </a:p>
+        </p:txBody>
+      </p:sp>
+      <p:sp>
+        <p:nvSpPr>
+          <p:cNvPr id="90" name="Textfeld 89">
+            <a:extLst>
+              <a:ext uri="{FF2B5EF4-FFF2-40B4-BE49-F238E27FC236}">
+                <a16:creationId xmlns:a16="http://schemas.microsoft.com/office/drawing/2014/main" id="{80841470-BABE-446E-9D53-D74AD5478920}"/>
+              </a:ext>
+            </a:extLst>
+          </p:cNvPr>
+          <p:cNvSpPr txBox="1"/>
+          <p:nvPr/>
+        </p:nvSpPr>
+        <p:spPr>
+          <a:xfrm>
+            <a:off x="9010182" y="0"/>
+            <a:ext cx="436338" cy="307777"/>
+          </a:xfrm>
+          <a:prstGeom prst="rect">
+            <a:avLst/>
+          </a:prstGeom>
+          <a:noFill/>
+        </p:spPr>
+        <p:txBody>
+          <a:bodyPr wrap="none" rtlCol="0">
+            <a:spAutoFit/>
+          </a:bodyPr>
+          <a:lstStyle/>
+          <a:p>
+            <a:r>
+              <a:rPr lang="de-DE" sz="1400" dirty="0"/>
+              <a:t>W1</a:t>
+            </a:r>
+          </a:p>
+        </p:txBody>
+      </p:sp>
+      <p:sp>
+        <p:nvSpPr>
+          <p:cNvPr id="91" name="Textfeld 90">
+            <a:extLst>
+              <a:ext uri="{FF2B5EF4-FFF2-40B4-BE49-F238E27FC236}">
+                <a16:creationId xmlns:a16="http://schemas.microsoft.com/office/drawing/2014/main" id="{9AB4DB31-3B4F-44A7-8FFD-5776368AFF96}"/>
+              </a:ext>
+            </a:extLst>
+          </p:cNvPr>
+          <p:cNvSpPr txBox="1"/>
+          <p:nvPr/>
+        </p:nvSpPr>
+        <p:spPr>
+          <a:xfrm>
+            <a:off x="11610838" y="-3"/>
+            <a:ext cx="436338" cy="307777"/>
+          </a:xfrm>
+          <a:prstGeom prst="rect">
+            <a:avLst/>
+          </a:prstGeom>
+          <a:noFill/>
+        </p:spPr>
+        <p:txBody>
+          <a:bodyPr wrap="none" rtlCol="0">
+            <a:spAutoFit/>
+          </a:bodyPr>
+          <a:lstStyle/>
+          <a:p>
+            <a:r>
+              <a:rPr lang="de-DE" sz="1400" dirty="0"/>
+              <a:t>W2</a:t>
+            </a:r>
+          </a:p>
+        </p:txBody>
+      </p:sp>
+      <p:sp>
+        <p:nvSpPr>
+          <p:cNvPr id="92" name="Textfeld 91">
+            <a:extLst>
+              <a:ext uri="{FF2B5EF4-FFF2-40B4-BE49-F238E27FC236}">
+                <a16:creationId xmlns:a16="http://schemas.microsoft.com/office/drawing/2014/main" id="{9BE848AB-AB2D-4D28-AC38-568593FE0ED3}"/>
+              </a:ext>
+            </a:extLst>
+          </p:cNvPr>
+          <p:cNvSpPr txBox="1"/>
+          <p:nvPr/>
+        </p:nvSpPr>
+        <p:spPr>
+          <a:xfrm>
+            <a:off x="14104535" y="-4"/>
+            <a:ext cx="436338" cy="307777"/>
+          </a:xfrm>
+          <a:prstGeom prst="rect">
+            <a:avLst/>
+          </a:prstGeom>
+          <a:noFill/>
+        </p:spPr>
+        <p:txBody>
+          <a:bodyPr wrap="none" rtlCol="0">
+            <a:spAutoFit/>
+          </a:bodyPr>
+          <a:lstStyle/>
+          <a:p>
+            <a:r>
+              <a:rPr lang="de-DE" sz="1400" dirty="0"/>
+              <a:t>W3</a:t>
+            </a:r>
+          </a:p>
+        </p:txBody>
+      </p:sp>
+      <p:sp>
+        <p:nvSpPr>
+          <p:cNvPr id="93" name="Textfeld 92">
+            <a:extLst>
+              <a:ext uri="{FF2B5EF4-FFF2-40B4-BE49-F238E27FC236}">
+                <a16:creationId xmlns:a16="http://schemas.microsoft.com/office/drawing/2014/main" id="{EF432956-7A0A-433E-9771-F0C4C298410B}"/>
+              </a:ext>
+            </a:extLst>
+          </p:cNvPr>
+          <p:cNvSpPr txBox="1"/>
+          <p:nvPr/>
+        </p:nvSpPr>
+        <p:spPr>
+          <a:xfrm>
+            <a:off x="16745571" y="-5"/>
+            <a:ext cx="436338" cy="307777"/>
+          </a:xfrm>
+          <a:prstGeom prst="rect">
+            <a:avLst/>
+          </a:prstGeom>
+          <a:noFill/>
+        </p:spPr>
+        <p:txBody>
+          <a:bodyPr wrap="none" rtlCol="0">
+            <a:spAutoFit/>
+          </a:bodyPr>
+          <a:lstStyle/>
+          <a:p>
+            <a:r>
+              <a:rPr lang="de-DE" sz="1400" dirty="0"/>
+              <a:t>W4</a:t>
+            </a:r>
+          </a:p>
+        </p:txBody>
+      </p:sp>
+      <p:sp>
+        <p:nvSpPr>
+          <p:cNvPr id="94" name="Textfeld 93">
+            <a:extLst>
+              <a:ext uri="{FF2B5EF4-FFF2-40B4-BE49-F238E27FC236}">
+                <a16:creationId xmlns:a16="http://schemas.microsoft.com/office/drawing/2014/main" id="{BE9EA217-1106-4D7B-B567-0463D1D8E0D9}"/>
+              </a:ext>
+            </a:extLst>
+          </p:cNvPr>
+          <p:cNvSpPr txBox="1"/>
+          <p:nvPr/>
+        </p:nvSpPr>
+        <p:spPr>
+          <a:xfrm>
+            <a:off x="19313467" y="-6"/>
+            <a:ext cx="436338" cy="307777"/>
+          </a:xfrm>
+          <a:prstGeom prst="rect">
+            <a:avLst/>
+          </a:prstGeom>
+          <a:noFill/>
+        </p:spPr>
+        <p:txBody>
+          <a:bodyPr wrap="none" rtlCol="0">
+            <a:spAutoFit/>
+          </a:bodyPr>
+          <a:lstStyle/>
+          <a:p>
+            <a:r>
+              <a:rPr lang="de-DE" sz="1400" dirty="0"/>
+              <a:t>W5</a:t>
+            </a:r>
+          </a:p>
+        </p:txBody>
+      </p:sp>
+      <p:sp>
+        <p:nvSpPr>
+          <p:cNvPr id="95" name="Textfeld 94">
+            <a:extLst>
+              <a:ext uri="{FF2B5EF4-FFF2-40B4-BE49-F238E27FC236}">
+                <a16:creationId xmlns:a16="http://schemas.microsoft.com/office/drawing/2014/main" id="{734D2C28-7105-4C88-BEA4-624ABC8CD9F9}"/>
+              </a:ext>
+            </a:extLst>
+          </p:cNvPr>
+          <p:cNvSpPr txBox="1"/>
+          <p:nvPr/>
+        </p:nvSpPr>
+        <p:spPr>
+          <a:xfrm>
+            <a:off x="21847544" y="-7"/>
+            <a:ext cx="436338" cy="307777"/>
+          </a:xfrm>
+          <a:prstGeom prst="rect">
+            <a:avLst/>
+          </a:prstGeom>
+          <a:noFill/>
+        </p:spPr>
+        <p:txBody>
+          <a:bodyPr wrap="none" rtlCol="0">
+            <a:spAutoFit/>
+          </a:bodyPr>
+          <a:lstStyle/>
+          <a:p>
+            <a:r>
+              <a:rPr lang="de-DE" sz="1400" dirty="0"/>
+              <a:t>W6</a:t>
+            </a:r>
+          </a:p>
+        </p:txBody>
+      </p:sp>
+      <p:sp>
+        <p:nvSpPr>
+          <p:cNvPr id="96" name="Rechteck 95">
+            <a:extLst>
+              <a:ext uri="{FF2B5EF4-FFF2-40B4-BE49-F238E27FC236}">
+                <a16:creationId xmlns:a16="http://schemas.microsoft.com/office/drawing/2014/main" id="{C61F3DBD-F261-4FB3-9025-A2EF84FA5504}"/>
+              </a:ext>
+            </a:extLst>
+          </p:cNvPr>
+          <p:cNvSpPr/>
+          <p:nvPr/>
+        </p:nvSpPr>
+        <p:spPr>
+          <a:xfrm>
+            <a:off x="10692472" y="367998"/>
+            <a:ext cx="2556913" cy="807446"/>
+          </a:xfrm>
+          <a:prstGeom prst="rect">
+            <a:avLst/>
+          </a:prstGeom>
+          <a:solidFill>
+            <a:schemeClr val="bg1">
+              <a:lumMod val="50000"/>
+              <a:alpha val="14118"/>
+            </a:schemeClr>
+          </a:solidFill>
+          <a:ln>
+            <a:noFill/>
+          </a:ln>
+        </p:spPr>
+        <p:style>
+          <a:lnRef idx="2">
+            <a:schemeClr val="accent1">
+              <a:shade val="50000"/>
+            </a:schemeClr>
+          </a:lnRef>
+          <a:fillRef idx="1">
+            <a:schemeClr val="accent1"/>
+          </a:fillRef>
+          <a:effectRef idx="0">
+            <a:schemeClr val="accent1"/>
+          </a:effectRef>
+          <a:fontRef idx="minor">
+            <a:schemeClr val="lt1"/>
+          </a:fontRef>
+        </p:style>
+        <p:txBody>
+          <a:bodyPr rtlCol="0" anchor="ctr"/>
+          <a:lstStyle/>
+          <a:p>
+            <a:pPr algn="ctr"/>
+            <a:endParaRPr lang="de-DE"/>
+          </a:p>
+        </p:txBody>
+      </p:sp>
+      <p:sp>
+        <p:nvSpPr>
+          <p:cNvPr id="99" name="Rechteck 98">
+            <a:extLst>
+              <a:ext uri="{FF2B5EF4-FFF2-40B4-BE49-F238E27FC236}">
+                <a16:creationId xmlns:a16="http://schemas.microsoft.com/office/drawing/2014/main" id="{733184B6-EBC1-4880-9B24-1794AF5E47BC}"/>
+              </a:ext>
+            </a:extLst>
+          </p:cNvPr>
+          <p:cNvSpPr/>
+          <p:nvPr/>
+        </p:nvSpPr>
+        <p:spPr>
+          <a:xfrm>
+            <a:off x="8129877" y="363664"/>
+            <a:ext cx="2556913" cy="807446"/>
+          </a:xfrm>
+          <a:prstGeom prst="rect">
+            <a:avLst/>
+          </a:prstGeom>
+          <a:solidFill>
+            <a:schemeClr val="bg1">
+              <a:lumMod val="50000"/>
+              <a:alpha val="14118"/>
+            </a:schemeClr>
+          </a:solidFill>
+          <a:ln>
+            <a:noFill/>
+          </a:ln>
+        </p:spPr>
+        <p:style>
+          <a:lnRef idx="2">
+            <a:schemeClr val="accent1">
+              <a:shade val="50000"/>
+            </a:schemeClr>
+          </a:lnRef>
+          <a:fillRef idx="1">
+            <a:schemeClr val="accent1"/>
+          </a:fillRef>
+          <a:effectRef idx="0">
+            <a:schemeClr val="accent1"/>
+          </a:effectRef>
+          <a:fontRef idx="minor">
+            <a:schemeClr val="lt1"/>
+          </a:fontRef>
+        </p:style>
+        <p:txBody>
+          <a:bodyPr rtlCol="0" anchor="ctr"/>
+          <a:lstStyle/>
+          <a:p>
+            <a:pPr algn="ctr"/>
+            <a:endParaRPr lang="de-DE"/>
+          </a:p>
+        </p:txBody>
+      </p:sp>
+      <p:sp>
+        <p:nvSpPr>
+          <p:cNvPr id="100" name="Rechteck 99">
+            <a:extLst>
+              <a:ext uri="{FF2B5EF4-FFF2-40B4-BE49-F238E27FC236}">
+                <a16:creationId xmlns:a16="http://schemas.microsoft.com/office/drawing/2014/main" id="{54EC77AC-11BD-43AE-AE32-6EF1EF6FCA17}"/>
+              </a:ext>
+            </a:extLst>
+          </p:cNvPr>
+          <p:cNvSpPr/>
+          <p:nvPr/>
+        </p:nvSpPr>
+        <p:spPr>
+          <a:xfrm>
+            <a:off x="13255066" y="360225"/>
+            <a:ext cx="2556913" cy="807446"/>
+          </a:xfrm>
+          <a:prstGeom prst="rect">
+            <a:avLst/>
+          </a:prstGeom>
+          <a:solidFill>
+            <a:schemeClr val="bg1">
+              <a:lumMod val="50000"/>
+              <a:alpha val="14118"/>
+            </a:schemeClr>
+          </a:solidFill>
+          <a:ln>
+            <a:noFill/>
+          </a:ln>
+        </p:spPr>
+        <p:style>
+          <a:lnRef idx="2">
+            <a:schemeClr val="accent1">
+              <a:shade val="50000"/>
+            </a:schemeClr>
+          </a:lnRef>
+          <a:fillRef idx="1">
+            <a:schemeClr val="accent1"/>
+          </a:fillRef>
+          <a:effectRef idx="0">
+            <a:schemeClr val="accent1"/>
+          </a:effectRef>
+          <a:fontRef idx="minor">
+            <a:schemeClr val="lt1"/>
+          </a:fontRef>
+        </p:style>
+        <p:txBody>
+          <a:bodyPr rtlCol="0" anchor="ctr"/>
+          <a:lstStyle/>
+          <a:p>
+            <a:pPr algn="ctr"/>
+            <a:endParaRPr lang="de-DE"/>
+          </a:p>
+        </p:txBody>
+      </p:sp>
+      <p:sp>
+        <p:nvSpPr>
+          <p:cNvPr id="101" name="Rechteck 100">
+            <a:extLst>
+              <a:ext uri="{FF2B5EF4-FFF2-40B4-BE49-F238E27FC236}">
+                <a16:creationId xmlns:a16="http://schemas.microsoft.com/office/drawing/2014/main" id="{5AE5D010-36DC-473D-83E1-27A2D00F918C}"/>
+              </a:ext>
+            </a:extLst>
+          </p:cNvPr>
+          <p:cNvSpPr/>
+          <p:nvPr/>
+        </p:nvSpPr>
+        <p:spPr>
+          <a:xfrm>
+            <a:off x="20899674" y="389082"/>
+            <a:ext cx="2556913" cy="807446"/>
+          </a:xfrm>
+          <a:prstGeom prst="rect">
+            <a:avLst/>
+          </a:prstGeom>
+          <a:solidFill>
+            <a:schemeClr val="bg1">
+              <a:lumMod val="50000"/>
+              <a:alpha val="14118"/>
+            </a:schemeClr>
+          </a:solidFill>
+          <a:ln>
+            <a:noFill/>
+          </a:ln>
+        </p:spPr>
+        <p:style>
+          <a:lnRef idx="2">
+            <a:schemeClr val="accent1">
+              <a:shade val="50000"/>
+            </a:schemeClr>
+          </a:lnRef>
+          <a:fillRef idx="1">
+            <a:schemeClr val="accent1"/>
+          </a:fillRef>
+          <a:effectRef idx="0">
+            <a:schemeClr val="accent1"/>
+          </a:effectRef>
+          <a:fontRef idx="minor">
+            <a:schemeClr val="lt1"/>
+          </a:fontRef>
+        </p:style>
+        <p:txBody>
+          <a:bodyPr rtlCol="0" anchor="ctr"/>
+          <a:lstStyle/>
+          <a:p>
+            <a:pPr algn="ctr"/>
+            <a:endParaRPr lang="de-DE"/>
+          </a:p>
+        </p:txBody>
+      </p:sp>
+      <p:sp>
+        <p:nvSpPr>
+          <p:cNvPr id="102" name="Textfeld 101">
+            <a:extLst>
+              <a:ext uri="{FF2B5EF4-FFF2-40B4-BE49-F238E27FC236}">
+                <a16:creationId xmlns:a16="http://schemas.microsoft.com/office/drawing/2014/main" id="{A05EAA4B-81BB-4F2C-9928-10E21AF2D736}"/>
+              </a:ext>
+            </a:extLst>
+          </p:cNvPr>
+          <p:cNvSpPr txBox="1"/>
+          <p:nvPr/>
+        </p:nvSpPr>
+        <p:spPr>
+          <a:xfrm>
+            <a:off x="611677" y="-4705"/>
+            <a:ext cx="761747" cy="307777"/>
+          </a:xfrm>
+          <a:prstGeom prst="rect">
+            <a:avLst/>
+          </a:prstGeom>
+          <a:noFill/>
+        </p:spPr>
+        <p:txBody>
+          <a:bodyPr wrap="none" rtlCol="0">
+            <a:spAutoFit/>
+          </a:bodyPr>
+          <a:lstStyle/>
+          <a:p>
+            <a:r>
+              <a:rPr lang="de-DE" sz="1400" dirty="0" err="1"/>
+              <a:t>channel</a:t>
+            </a:r>
+            <a:endParaRPr lang="de-DE" sz="1400" dirty="0"/>
+          </a:p>
+        </p:txBody>
+      </p:sp>
+      <p:sp>
+        <p:nvSpPr>
+          <p:cNvPr id="103" name="Textfeld 102">
+            <a:extLst>
+              <a:ext uri="{FF2B5EF4-FFF2-40B4-BE49-F238E27FC236}">
+                <a16:creationId xmlns:a16="http://schemas.microsoft.com/office/drawing/2014/main" id="{E3953A0E-2645-40D4-9AAA-E2751AE389F0}"/>
+              </a:ext>
+            </a:extLst>
+          </p:cNvPr>
+          <p:cNvSpPr txBox="1"/>
+          <p:nvPr/>
+        </p:nvSpPr>
+        <p:spPr>
+          <a:xfrm rot="16200000">
+            <a:off x="-69744" y="135325"/>
+            <a:ext cx="599395" cy="307777"/>
+          </a:xfrm>
+          <a:prstGeom prst="rect">
+            <a:avLst/>
+          </a:prstGeom>
+          <a:noFill/>
+        </p:spPr>
+        <p:txBody>
+          <a:bodyPr wrap="none" rtlCol="0">
+            <a:spAutoFit/>
+          </a:bodyPr>
+          <a:lstStyle/>
+          <a:p>
+            <a:r>
+              <a:rPr lang="de-DE" sz="1400" dirty="0"/>
+              <a:t>grade</a:t>
+            </a:r>
+          </a:p>
+        </p:txBody>
+      </p:sp>
+      <p:sp>
+        <p:nvSpPr>
+          <p:cNvPr id="104" name="Rechteck 103">
+            <a:extLst>
+              <a:ext uri="{FF2B5EF4-FFF2-40B4-BE49-F238E27FC236}">
+                <a16:creationId xmlns:a16="http://schemas.microsoft.com/office/drawing/2014/main" id="{2F52E759-FBC5-4814-BC8E-30426EE4B63B}"/>
+              </a:ext>
+            </a:extLst>
+          </p:cNvPr>
+          <p:cNvSpPr/>
+          <p:nvPr/>
+        </p:nvSpPr>
+        <p:spPr>
+          <a:xfrm>
+            <a:off x="500568" y="2066052"/>
+            <a:ext cx="2556913" cy="807446"/>
+          </a:xfrm>
+          <a:prstGeom prst="rect">
+            <a:avLst/>
+          </a:prstGeom>
+          <a:solidFill>
+            <a:schemeClr val="accent6">
+              <a:alpha val="14118"/>
+            </a:schemeClr>
+          </a:solidFill>
+          <a:ln>
+            <a:noFill/>
+          </a:ln>
+        </p:spPr>
+        <p:style>
+          <a:lnRef idx="2">
+            <a:schemeClr val="accent1">
+              <a:shade val="50000"/>
+            </a:schemeClr>
+          </a:lnRef>
+          <a:fillRef idx="1">
+            <a:schemeClr val="accent1"/>
+          </a:fillRef>
+          <a:effectRef idx="0">
+            <a:schemeClr val="accent1"/>
+          </a:effectRef>
+          <a:fontRef idx="minor">
+            <a:schemeClr val="lt1"/>
+          </a:fontRef>
+        </p:style>
+        <p:txBody>
+          <a:bodyPr rtlCol="0" anchor="ctr"/>
+          <a:lstStyle/>
+          <a:p>
+            <a:pPr algn="ctr"/>
+            <a:endParaRPr lang="de-DE"/>
+          </a:p>
+        </p:txBody>
+      </p:sp>
+      <p:sp>
+        <p:nvSpPr>
+          <p:cNvPr id="105" name="Rechteck 104">
+            <a:extLst>
+              <a:ext uri="{FF2B5EF4-FFF2-40B4-BE49-F238E27FC236}">
+                <a16:creationId xmlns:a16="http://schemas.microsoft.com/office/drawing/2014/main" id="{B5E84772-B228-49DB-8ECE-85E986399654}"/>
+              </a:ext>
+            </a:extLst>
+          </p:cNvPr>
+          <p:cNvSpPr/>
+          <p:nvPr/>
+        </p:nvSpPr>
+        <p:spPr>
+          <a:xfrm>
+            <a:off x="13254806" y="1167531"/>
+            <a:ext cx="2556913" cy="807446"/>
+          </a:xfrm>
+          <a:prstGeom prst="rect">
+            <a:avLst/>
+          </a:prstGeom>
+          <a:solidFill>
+            <a:schemeClr val="accent6">
+              <a:alpha val="14118"/>
+            </a:schemeClr>
+          </a:solidFill>
+          <a:ln>
+            <a:noFill/>
+          </a:ln>
+        </p:spPr>
+        <p:style>
+          <a:lnRef idx="2">
+            <a:schemeClr val="accent1">
+              <a:shade val="50000"/>
+            </a:schemeClr>
+          </a:lnRef>
+          <a:fillRef idx="1">
+            <a:schemeClr val="accent1"/>
+          </a:fillRef>
+          <a:effectRef idx="0">
+            <a:schemeClr val="accent1"/>
+          </a:effectRef>
+          <a:fontRef idx="minor">
+            <a:schemeClr val="lt1"/>
+          </a:fontRef>
+        </p:style>
+        <p:txBody>
+          <a:bodyPr rtlCol="0" anchor="ctr"/>
+          <a:lstStyle/>
+          <a:p>
+            <a:pPr algn="ctr"/>
+            <a:endParaRPr lang="de-DE"/>
+          </a:p>
+        </p:txBody>
+      </p:sp>
+      <p:sp>
+        <p:nvSpPr>
+          <p:cNvPr id="106" name="Rechteck 105">
+            <a:extLst>
+              <a:ext uri="{FF2B5EF4-FFF2-40B4-BE49-F238E27FC236}">
+                <a16:creationId xmlns:a16="http://schemas.microsoft.com/office/drawing/2014/main" id="{952BF2A0-6CB2-4712-989B-073D62F39BC2}"/>
+              </a:ext>
+            </a:extLst>
+          </p:cNvPr>
+          <p:cNvSpPr/>
+          <p:nvPr/>
+        </p:nvSpPr>
+        <p:spPr>
+          <a:xfrm>
+            <a:off x="15808018" y="1166775"/>
+            <a:ext cx="2556913" cy="807446"/>
+          </a:xfrm>
+          <a:prstGeom prst="rect">
+            <a:avLst/>
+          </a:prstGeom>
+          <a:solidFill>
+            <a:schemeClr val="accent6">
+              <a:alpha val="14118"/>
+            </a:schemeClr>
+          </a:solidFill>
+          <a:ln>
+            <a:noFill/>
+          </a:ln>
+        </p:spPr>
+        <p:style>
+          <a:lnRef idx="2">
+            <a:schemeClr val="accent1">
+              <a:shade val="50000"/>
+            </a:schemeClr>
+          </a:lnRef>
+          <a:fillRef idx="1">
+            <a:schemeClr val="accent1"/>
+          </a:fillRef>
+          <a:effectRef idx="0">
+            <a:schemeClr val="accent1"/>
+          </a:effectRef>
+          <a:fontRef idx="minor">
+            <a:schemeClr val="lt1"/>
+          </a:fontRef>
+        </p:style>
+        <p:txBody>
+          <a:bodyPr rtlCol="0" anchor="ctr"/>
+          <a:lstStyle/>
+          <a:p>
+            <a:pPr algn="ctr"/>
+            <a:endParaRPr lang="de-DE"/>
+          </a:p>
+        </p:txBody>
+      </p:sp>
+      <p:sp>
+        <p:nvSpPr>
+          <p:cNvPr id="107" name="Rechteck 106">
+            <a:extLst>
+              <a:ext uri="{FF2B5EF4-FFF2-40B4-BE49-F238E27FC236}">
+                <a16:creationId xmlns:a16="http://schemas.microsoft.com/office/drawing/2014/main" id="{1AA4B4DE-6386-4A17-B47B-136685EC5617}"/>
+              </a:ext>
+            </a:extLst>
+          </p:cNvPr>
+          <p:cNvSpPr/>
+          <p:nvPr/>
+        </p:nvSpPr>
+        <p:spPr>
+          <a:xfrm>
+            <a:off x="18378634" y="2775161"/>
+            <a:ext cx="2556913" cy="807446"/>
+          </a:xfrm>
+          <a:prstGeom prst="rect">
+            <a:avLst/>
+          </a:prstGeom>
+          <a:solidFill>
+            <a:schemeClr val="accent6">
+              <a:alpha val="14118"/>
+            </a:schemeClr>
+          </a:solidFill>
+          <a:ln>
+            <a:noFill/>
+          </a:ln>
+        </p:spPr>
+        <p:style>
+          <a:lnRef idx="2">
+            <a:schemeClr val="accent1">
+              <a:shade val="50000"/>
+            </a:schemeClr>
+          </a:lnRef>
+          <a:fillRef idx="1">
+            <a:schemeClr val="accent1"/>
+          </a:fillRef>
+          <a:effectRef idx="0">
+            <a:schemeClr val="accent1"/>
+          </a:effectRef>
+          <a:fontRef idx="minor">
+            <a:schemeClr val="lt1"/>
+          </a:fontRef>
+        </p:style>
+        <p:txBody>
+          <a:bodyPr rtlCol="0" anchor="ctr"/>
+          <a:lstStyle/>
+          <a:p>
+            <a:pPr algn="ctr"/>
+            <a:endParaRPr lang="de-DE"/>
+          </a:p>
+        </p:txBody>
+      </p:sp>
+      <p:sp>
+        <p:nvSpPr>
+          <p:cNvPr id="108" name="Rechteck 107">
+            <a:extLst>
+              <a:ext uri="{FF2B5EF4-FFF2-40B4-BE49-F238E27FC236}">
+                <a16:creationId xmlns:a16="http://schemas.microsoft.com/office/drawing/2014/main" id="{E6160F09-C2F7-4C55-B905-B000532ECB4D}"/>
+              </a:ext>
+            </a:extLst>
+          </p:cNvPr>
+          <p:cNvSpPr/>
+          <p:nvPr/>
+        </p:nvSpPr>
+        <p:spPr>
+          <a:xfrm>
+            <a:off x="20951782" y="2775160"/>
+            <a:ext cx="2485168" cy="807446"/>
+          </a:xfrm>
+          <a:prstGeom prst="rect">
+            <a:avLst/>
+          </a:prstGeom>
+          <a:solidFill>
+            <a:schemeClr val="accent6">
+              <a:alpha val="14118"/>
+            </a:schemeClr>
+          </a:solidFill>
+          <a:ln>
+            <a:noFill/>
+          </a:ln>
+        </p:spPr>
+        <p:style>
+          <a:lnRef idx="2">
+            <a:schemeClr val="accent1">
+              <a:shade val="50000"/>
+            </a:schemeClr>
+          </a:lnRef>
+          <a:fillRef idx="1">
+            <a:schemeClr val="accent1"/>
+          </a:fillRef>
+          <a:effectRef idx="0">
+            <a:schemeClr val="accent1"/>
+          </a:effectRef>
+          <a:fontRef idx="minor">
+            <a:schemeClr val="lt1"/>
+          </a:fontRef>
+        </p:style>
+        <p:txBody>
+          <a:bodyPr rtlCol="0" anchor="ctr"/>
+          <a:lstStyle/>
+          <a:p>
+            <a:pPr algn="ctr"/>
+            <a:endParaRPr lang="de-DE"/>
+          </a:p>
+        </p:txBody>
+      </p:sp>
     </p:spTree>
     <p:extLst>
       <p:ext uri="{BB962C8B-B14F-4D97-AF65-F5344CB8AC3E}">
-        <p14:creationId xmlns:p14="http://schemas.microsoft.com/office/powerpoint/2010/main" val="1853315493"/>
+        <p14:creationId xmlns:p14="http://schemas.microsoft.com/office/powerpoint/2010/main" val="1398196630"/>
       </p:ext>
     </p:extLst>
   </p:cSld>

</xml_diff>